<commit_message>
20201007 R mini project
</commit_message>
<xml_diff>
--- a/mini_project/R 프로젝트.pptx
+++ b/mini_project/R 프로젝트.pptx
@@ -10,17 +10,19 @@
     <p:sldId id="262" r:id="rId4"/>
     <p:sldId id="257" r:id="rId5"/>
     <p:sldId id="259" r:id="rId6"/>
-    <p:sldId id="267" r:id="rId7"/>
-    <p:sldId id="260" r:id="rId8"/>
-    <p:sldId id="261" r:id="rId9"/>
-    <p:sldId id="263" r:id="rId10"/>
-    <p:sldId id="264" r:id="rId11"/>
-    <p:sldId id="265" r:id="rId12"/>
-    <p:sldId id="270" r:id="rId13"/>
-    <p:sldId id="271" r:id="rId14"/>
-    <p:sldId id="272" r:id="rId15"/>
-    <p:sldId id="268" r:id="rId16"/>
-    <p:sldId id="269" r:id="rId17"/>
+    <p:sldId id="273" r:id="rId7"/>
+    <p:sldId id="276" r:id="rId8"/>
+    <p:sldId id="267" r:id="rId9"/>
+    <p:sldId id="260" r:id="rId10"/>
+    <p:sldId id="261" r:id="rId11"/>
+    <p:sldId id="263" r:id="rId12"/>
+    <p:sldId id="264" r:id="rId13"/>
+    <p:sldId id="265" r:id="rId14"/>
+    <p:sldId id="270" r:id="rId15"/>
+    <p:sldId id="271" r:id="rId16"/>
+    <p:sldId id="272" r:id="rId17"/>
+    <p:sldId id="268" r:id="rId18"/>
+    <p:sldId id="269" r:id="rId19"/>
   </p:sldIdLst>
   <p:sldSz cx="12192000" cy="6858000"/>
   <p:notesSz cx="6858000" cy="9144000"/>
@@ -3435,7 +3437,7 @@
         </p:nvSpPr>
         <p:spPr>
           <a:xfrm>
-            <a:off x="1026161" y="604605"/>
+            <a:off x="1940560" y="914400"/>
             <a:ext cx="6888480" cy="369332"/>
           </a:xfrm>
           <a:prstGeom prst="rect">
@@ -3451,15 +3453,7 @@
           <a:p>
             <a:r>
               <a:rPr lang="ko-KR" altLang="en-US" dirty="0"/>
-              <a:t>알고리즘 별 평균 </a:t>
-            </a:r>
-            <a:r>
-              <a:rPr lang="ko-KR" altLang="en-US" dirty="0" err="1"/>
-              <a:t>정답율</a:t>
-            </a:r>
-            <a:r>
-              <a:rPr lang="ko-KR" altLang="en-US" dirty="0"/>
-              <a:t> 그래프</a:t>
+              <a:t>알고리즘 별 그래프 해설</a:t>
             </a:r>
           </a:p>
         </p:txBody>
@@ -3469,7 +3463,7 @@
           <p:cNvPr id="4" name="그림 3">
             <a:extLst>
               <a:ext uri="{FF2B5EF4-FFF2-40B4-BE49-F238E27FC236}">
-                <a16:creationId xmlns:a16="http://schemas.microsoft.com/office/drawing/2014/main" id="{EF7E698E-4857-48A7-842E-F255164E1E70}"/>
+                <a16:creationId xmlns:a16="http://schemas.microsoft.com/office/drawing/2014/main" id="{91FE9064-4642-4C89-9F33-D221CCA2CBAA}"/>
               </a:ext>
             </a:extLst>
           </p:cNvPr>
@@ -3491,21 +3485,57 @@
           </a:stretch>
         </p:blipFill>
         <p:spPr>
-          <a:xfrm>
-            <a:off x="1788768" y="1431690"/>
-            <a:ext cx="8119371" cy="4338655"/>
+          <a:xfrm rot="10800000" flipH="1" flipV="1">
+            <a:off x="576115" y="2005469"/>
+            <a:ext cx="5303727" cy="2847060"/>
           </a:xfrm>
           <a:prstGeom prst="rect">
             <a:avLst/>
           </a:prstGeom>
         </p:spPr>
       </p:pic>
-      <p:sp>
-        <p:nvSpPr>
-          <p:cNvPr id="6" name="TextBox 5">
-            <a:extLst>
-              <a:ext uri="{FF2B5EF4-FFF2-40B4-BE49-F238E27FC236}">
-                <a16:creationId xmlns:a16="http://schemas.microsoft.com/office/drawing/2014/main" id="{467B8584-0480-4C50-AD17-BF134A41CC5C}"/>
+      <p:pic>
+        <p:nvPicPr>
+          <p:cNvPr id="6" name="그림 5">
+            <a:extLst>
+              <a:ext uri="{FF2B5EF4-FFF2-40B4-BE49-F238E27FC236}">
+                <a16:creationId xmlns:a16="http://schemas.microsoft.com/office/drawing/2014/main" id="{E2705A7E-C841-42B2-B154-992D8D47EEAC}"/>
+              </a:ext>
+            </a:extLst>
+          </p:cNvPr>
+          <p:cNvPicPr>
+            <a:picLocks noChangeAspect="1"/>
+          </p:cNvPicPr>
+          <p:nvPr/>
+        </p:nvPicPr>
+        <p:blipFill>
+          <a:blip r:embed="rId3">
+            <a:extLst>
+              <a:ext uri="{28A0092B-C50C-407E-A947-70E740481C1C}">
+                <a14:useLocalDpi xmlns:a14="http://schemas.microsoft.com/office/drawing/2010/main" val="0"/>
+              </a:ext>
+            </a:extLst>
+          </a:blip>
+          <a:stretch>
+            <a:fillRect/>
+          </a:stretch>
+        </p:blipFill>
+        <p:spPr>
+          <a:xfrm>
+            <a:off x="6277694" y="2005469"/>
+            <a:ext cx="5102691" cy="2847061"/>
+          </a:xfrm>
+          <a:prstGeom prst="rect">
+            <a:avLst/>
+          </a:prstGeom>
+        </p:spPr>
+      </p:pic>
+      <p:sp>
+        <p:nvSpPr>
+          <p:cNvPr id="8" name="TextBox 7">
+            <a:extLst>
+              <a:ext uri="{FF2B5EF4-FFF2-40B4-BE49-F238E27FC236}">
+                <a16:creationId xmlns:a16="http://schemas.microsoft.com/office/drawing/2014/main" id="{4A87B64F-B918-4AA4-BBC9-99FD08015CA5}"/>
               </a:ext>
             </a:extLst>
           </p:cNvPr>
@@ -3514,8 +3544,8 @@
         </p:nvSpPr>
         <p:spPr>
           <a:xfrm>
-            <a:off x="2025584" y="6043432"/>
-            <a:ext cx="6888480" cy="369332"/>
+            <a:off x="1072682" y="5204935"/>
+            <a:ext cx="4173086" cy="369332"/>
           </a:xfrm>
           <a:prstGeom prst="rect">
             <a:avLst/>
@@ -3529,25 +3559,67 @@
           <a:lstStyle/>
           <a:p>
             <a:r>
+              <a:rPr lang="ko-KR" altLang="en-US" dirty="0"/>
+              <a:t>우측이 볼록한 그래프 </a:t>
+            </a:r>
+            <a:r>
               <a:rPr lang="en-US" altLang="ko-KR" dirty="0"/>
-              <a:t>40%~65% </a:t>
+              <a:t>-&gt; </a:t>
             </a:r>
             <a:r>
               <a:rPr lang="ko-KR" altLang="en-US" dirty="0"/>
-              <a:t>까지 평균 정답율이 골고루 분포함을 알 수 있다</a:t>
+              <a:t>난이도 쉬움</a:t>
+            </a:r>
+          </a:p>
+        </p:txBody>
+      </p:sp>
+      <p:sp>
+        <p:nvSpPr>
+          <p:cNvPr id="9" name="TextBox 8">
+            <a:extLst>
+              <a:ext uri="{FF2B5EF4-FFF2-40B4-BE49-F238E27FC236}">
+                <a16:creationId xmlns:a16="http://schemas.microsoft.com/office/drawing/2014/main" id="{BA6CCE80-F996-43CB-8744-3C0DA53B1156}"/>
+              </a:ext>
+            </a:extLst>
+          </p:cNvPr>
+          <p:cNvSpPr txBox="1"/>
+          <p:nvPr/>
+        </p:nvSpPr>
+        <p:spPr>
+          <a:xfrm>
+            <a:off x="6946232" y="5204935"/>
+            <a:ext cx="4173086" cy="646331"/>
+          </a:xfrm>
+          <a:prstGeom prst="rect">
+            <a:avLst/>
+          </a:prstGeom>
+          <a:noFill/>
+        </p:spPr>
+        <p:txBody>
+          <a:bodyPr wrap="square" rtlCol="0">
+            <a:spAutoFit/>
+          </a:bodyPr>
+          <a:lstStyle/>
+          <a:p>
+            <a:r>
+              <a:rPr lang="ko-KR" altLang="en-US" dirty="0"/>
+              <a:t>좌측이 볼록한 그래프 </a:t>
             </a:r>
             <a:r>
               <a:rPr lang="en-US" altLang="ko-KR" dirty="0"/>
-              <a:t>.</a:t>
-            </a:r>
-            <a:endParaRPr lang="ko-KR" altLang="en-US" dirty="0"/>
+              <a:t>-&gt; </a:t>
+            </a:r>
+            <a:r>
+              <a:rPr lang="ko-KR" altLang="en-US" dirty="0"/>
+              <a:t>난이도 어려움</a:t>
+            </a:r>
           </a:p>
         </p:txBody>
       </p:sp>
     </p:spTree>
     <p:extLst>
       <p:ext uri="{BB962C8B-B14F-4D97-AF65-F5344CB8AC3E}">
-        <p14:creationId xmlns:p14="http://schemas.microsoft.com/office/powerpoint/2010/main" val="3026028332"/>
+        <p14:creationId xmlns:p14="http://schemas.microsoft.com/office/powerpoint/2010/main" val="969780874"/>
       </p:ext>
     </p:extLst>
   </p:cSld>
@@ -3576,10 +3648,10 @@
       </p:grpSpPr>
       <p:sp>
         <p:nvSpPr>
-          <p:cNvPr id="6" name="TextBox 5">
-            <a:extLst>
-              <a:ext uri="{FF2B5EF4-FFF2-40B4-BE49-F238E27FC236}">
-                <a16:creationId xmlns:a16="http://schemas.microsoft.com/office/drawing/2014/main" id="{02E5BBF4-7776-4728-84D0-5E023D329C36}"/>
+          <p:cNvPr id="2" name="TextBox 1">
+            <a:extLst>
+              <a:ext uri="{FF2B5EF4-FFF2-40B4-BE49-F238E27FC236}">
+                <a16:creationId xmlns:a16="http://schemas.microsoft.com/office/drawing/2014/main" id="{BC1C2F49-ADD0-44F2-B739-4AC4205D5D85}"/>
               </a:ext>
             </a:extLst>
           </p:cNvPr>
@@ -3588,8 +3660,8 @@
         </p:nvSpPr>
         <p:spPr>
           <a:xfrm>
-            <a:off x="1217061" y="1463039"/>
-            <a:ext cx="3709469" cy="369332"/>
+            <a:off x="1940560" y="914400"/>
+            <a:ext cx="6888480" cy="646331"/>
           </a:xfrm>
           <a:prstGeom prst="rect">
             <a:avLst/>
@@ -3603,20 +3675,39 @@
           <a:lstStyle/>
           <a:p>
             <a:r>
-              <a:rPr lang="ko-KR" altLang="en-US" dirty="0" err="1"/>
-              <a:t>정답율</a:t>
-            </a:r>
-            <a:r>
               <a:rPr lang="ko-KR" altLang="en-US" dirty="0"/>
-              <a:t> 높은 순 도표</a:t>
-            </a:r>
+              <a:t>가설</a:t>
+            </a:r>
+            <a:r>
+              <a:rPr lang="en-US" altLang="ko-KR" dirty="0"/>
+              <a:t>2: </a:t>
+            </a:r>
+            <a:r>
+              <a:rPr lang="ko-KR" altLang="en-US" dirty="0"/>
+              <a:t>평균 정답율이 알고리즘의 난이도를 나타낼 것이다</a:t>
+            </a:r>
+            <a:r>
+              <a:rPr lang="en-US" altLang="ko-KR" dirty="0"/>
+              <a:t>.</a:t>
+            </a:r>
+          </a:p>
+          <a:p>
+            <a:r>
+              <a:rPr lang="ko-KR" altLang="en-US" dirty="0"/>
+              <a:t>평균 정답율이 높을수록 쉬운 알고리즘일 것이다</a:t>
+            </a:r>
+            <a:r>
+              <a:rPr lang="en-US" altLang="ko-KR" dirty="0"/>
+              <a:t>.</a:t>
+            </a:r>
+            <a:endParaRPr lang="ko-KR" altLang="en-US" dirty="0"/>
           </a:p>
         </p:txBody>
       </p:sp>
     </p:spTree>
     <p:extLst>
       <p:ext uri="{BB962C8B-B14F-4D97-AF65-F5344CB8AC3E}">
-        <p14:creationId xmlns:p14="http://schemas.microsoft.com/office/powerpoint/2010/main" val="659063196"/>
+        <p14:creationId xmlns:p14="http://schemas.microsoft.com/office/powerpoint/2010/main" val="3901317519"/>
       </p:ext>
     </p:extLst>
   </p:cSld>
@@ -3645,10 +3736,10 @@
       </p:grpSpPr>
       <p:sp>
         <p:nvSpPr>
-          <p:cNvPr id="6" name="TextBox 5">
-            <a:extLst>
-              <a:ext uri="{FF2B5EF4-FFF2-40B4-BE49-F238E27FC236}">
-                <a16:creationId xmlns:a16="http://schemas.microsoft.com/office/drawing/2014/main" id="{02E5BBF4-7776-4728-84D0-5E023D329C36}"/>
+          <p:cNvPr id="2" name="TextBox 1">
+            <a:extLst>
+              <a:ext uri="{FF2B5EF4-FFF2-40B4-BE49-F238E27FC236}">
+                <a16:creationId xmlns:a16="http://schemas.microsoft.com/office/drawing/2014/main" id="{BC1C2F49-ADD0-44F2-B739-4AC4205D5D85}"/>
               </a:ext>
             </a:extLst>
           </p:cNvPr>
@@ -3657,8 +3748,8 @@
         </p:nvSpPr>
         <p:spPr>
           <a:xfrm>
-            <a:off x="1217060" y="1463039"/>
-            <a:ext cx="7282047" cy="646331"/>
+            <a:off x="1026161" y="604605"/>
+            <a:ext cx="6888480" cy="369332"/>
           </a:xfrm>
           <a:prstGeom prst="rect">
             <a:avLst/>
@@ -3673,7 +3764,7 @@
           <a:p>
             <a:r>
               <a:rPr lang="ko-KR" altLang="en-US" dirty="0"/>
-              <a:t>평균 </a:t>
+              <a:t>알고리즘 별 평균 </a:t>
             </a:r>
             <a:r>
               <a:rPr lang="ko-KR" altLang="en-US" dirty="0" err="1"/>
@@ -3681,38 +3772,86 @@
             </a:r>
             <a:r>
               <a:rPr lang="ko-KR" altLang="en-US" dirty="0"/>
-              <a:t> 제일 높은 알고리즘의 문제 보여주기</a:t>
-            </a:r>
+              <a:t> 그래프</a:t>
+            </a:r>
+          </a:p>
+        </p:txBody>
+      </p:sp>
+      <p:pic>
+        <p:nvPicPr>
+          <p:cNvPr id="4" name="그림 3">
+            <a:extLst>
+              <a:ext uri="{FF2B5EF4-FFF2-40B4-BE49-F238E27FC236}">
+                <a16:creationId xmlns:a16="http://schemas.microsoft.com/office/drawing/2014/main" id="{EF7E698E-4857-48A7-842E-F255164E1E70}"/>
+              </a:ext>
+            </a:extLst>
+          </p:cNvPr>
+          <p:cNvPicPr>
+            <a:picLocks noChangeAspect="1"/>
+          </p:cNvPicPr>
+          <p:nvPr/>
+        </p:nvPicPr>
+        <p:blipFill>
+          <a:blip r:embed="rId2">
+            <a:extLst>
+              <a:ext uri="{28A0092B-C50C-407E-A947-70E740481C1C}">
+                <a14:useLocalDpi xmlns:a14="http://schemas.microsoft.com/office/drawing/2010/main" val="0"/>
+              </a:ext>
+            </a:extLst>
+          </a:blip>
+          <a:stretch>
+            <a:fillRect/>
+          </a:stretch>
+        </p:blipFill>
+        <p:spPr>
+          <a:xfrm>
+            <a:off x="1788768" y="1431690"/>
+            <a:ext cx="8119371" cy="4338655"/>
+          </a:xfrm>
+          <a:prstGeom prst="rect">
+            <a:avLst/>
+          </a:prstGeom>
+        </p:spPr>
+      </p:pic>
+      <p:sp>
+        <p:nvSpPr>
+          <p:cNvPr id="6" name="TextBox 5">
+            <a:extLst>
+              <a:ext uri="{FF2B5EF4-FFF2-40B4-BE49-F238E27FC236}">
+                <a16:creationId xmlns:a16="http://schemas.microsoft.com/office/drawing/2014/main" id="{467B8584-0480-4C50-AD17-BF134A41CC5C}"/>
+              </a:ext>
+            </a:extLst>
+          </p:cNvPr>
+          <p:cNvSpPr txBox="1"/>
+          <p:nvPr/>
+        </p:nvSpPr>
+        <p:spPr>
+          <a:xfrm>
+            <a:off x="2025584" y="6043432"/>
+            <a:ext cx="6888480" cy="369332"/>
+          </a:xfrm>
+          <a:prstGeom prst="rect">
+            <a:avLst/>
+          </a:prstGeom>
+          <a:noFill/>
+        </p:spPr>
+        <p:txBody>
+          <a:bodyPr wrap="square" rtlCol="0">
+            <a:spAutoFit/>
+          </a:bodyPr>
+          <a:lstStyle/>
+          <a:p>
             <a:r>
               <a:rPr lang="en-US" altLang="ko-KR" dirty="0"/>
-              <a:t>-</a:t>
+              <a:t>40%~65% </a:t>
             </a:r>
             <a:r>
               <a:rPr lang="ko-KR" altLang="en-US" dirty="0"/>
-              <a:t>캡처</a:t>
-            </a:r>
-            <a:endParaRPr lang="en-US" altLang="ko-KR" dirty="0"/>
-          </a:p>
-          <a:p>
+              <a:t>까지 평균 정답율이 골고루 분포함을 알 수 있다</a:t>
+            </a:r>
             <a:r>
               <a:rPr lang="en-US" altLang="ko-KR" dirty="0"/>
-              <a:t>(</a:t>
-            </a:r>
-            <a:r>
-              <a:rPr lang="ko-KR" altLang="en-US" dirty="0"/>
-              <a:t>풀어봤더니 파이썬 기초를 가지고 풀 수 있었다</a:t>
-            </a:r>
-            <a:r>
-              <a:rPr lang="en-US" altLang="ko-KR" dirty="0"/>
-              <a:t>. </a:t>
-            </a:r>
-            <a:r>
-              <a:rPr lang="ko-KR" altLang="en-US" dirty="0"/>
-              <a:t>어렵지 않았음</a:t>
-            </a:r>
-            <a:r>
-              <a:rPr lang="en-US" altLang="ko-KR" dirty="0"/>
-              <a:t>)</a:t>
+              <a:t>.</a:t>
             </a:r>
             <a:endParaRPr lang="ko-KR" altLang="en-US" dirty="0"/>
           </a:p>
@@ -3721,7 +3860,7 @@
     </p:spTree>
     <p:extLst>
       <p:ext uri="{BB962C8B-B14F-4D97-AF65-F5344CB8AC3E}">
-        <p14:creationId xmlns:p14="http://schemas.microsoft.com/office/powerpoint/2010/main" val="1961210455"/>
+        <p14:creationId xmlns:p14="http://schemas.microsoft.com/office/powerpoint/2010/main" val="3026028332"/>
       </p:ext>
     </p:extLst>
   </p:cSld>
@@ -3762,8 +3901,8 @@
         </p:nvSpPr>
         <p:spPr>
           <a:xfrm>
-            <a:off x="1217060" y="1463039"/>
-            <a:ext cx="5963385" cy="646331"/>
+            <a:off x="1217061" y="1463039"/>
+            <a:ext cx="3709469" cy="369332"/>
           </a:xfrm>
           <a:prstGeom prst="rect">
             <a:avLst/>
@@ -3777,48 +3916,20 @@
           <a:lstStyle/>
           <a:p>
             <a:r>
-              <a:rPr lang="ko-KR" altLang="en-US" dirty="0"/>
-              <a:t>평균 </a:t>
-            </a:r>
-            <a:r>
               <a:rPr lang="ko-KR" altLang="en-US" dirty="0" err="1"/>
               <a:t>정답율</a:t>
             </a:r>
             <a:r>
               <a:rPr lang="ko-KR" altLang="en-US" dirty="0"/>
-              <a:t> 제일 낮은 알고리즘의 문제 보여주기</a:t>
-            </a:r>
-            <a:r>
-              <a:rPr lang="en-US" altLang="ko-KR" dirty="0"/>
-              <a:t>-</a:t>
-            </a:r>
-            <a:r>
-              <a:rPr lang="ko-KR" altLang="en-US" dirty="0"/>
-              <a:t>캡처</a:t>
-            </a:r>
-            <a:endParaRPr lang="en-US" altLang="ko-KR" dirty="0"/>
-          </a:p>
-          <a:p>
-            <a:r>
-              <a:rPr lang="en-US" altLang="ko-KR" dirty="0"/>
-              <a:t>(</a:t>
-            </a:r>
-            <a:r>
-              <a:rPr lang="ko-KR" altLang="en-US" dirty="0"/>
-              <a:t>너무 어려워요</a:t>
-            </a:r>
-            <a:r>
-              <a:rPr lang="en-US" altLang="ko-KR" dirty="0"/>
-              <a:t>)</a:t>
-            </a:r>
-            <a:endParaRPr lang="ko-KR" altLang="en-US" dirty="0"/>
+              <a:t> 높은 순 도표</a:t>
+            </a:r>
           </a:p>
         </p:txBody>
       </p:sp>
     </p:spTree>
     <p:extLst>
       <p:ext uri="{BB962C8B-B14F-4D97-AF65-F5344CB8AC3E}">
-        <p14:creationId xmlns:p14="http://schemas.microsoft.com/office/powerpoint/2010/main" val="2453587499"/>
+        <p14:creationId xmlns:p14="http://schemas.microsoft.com/office/powerpoint/2010/main" val="659063196"/>
       </p:ext>
     </p:extLst>
   </p:cSld>
@@ -3847,10 +3958,10 @@
       </p:grpSpPr>
       <p:sp>
         <p:nvSpPr>
-          <p:cNvPr id="2" name="TextBox 1">
-            <a:extLst>
-              <a:ext uri="{FF2B5EF4-FFF2-40B4-BE49-F238E27FC236}">
-                <a16:creationId xmlns:a16="http://schemas.microsoft.com/office/drawing/2014/main" id="{BC1C2F49-ADD0-44F2-B739-4AC4205D5D85}"/>
+          <p:cNvPr id="6" name="TextBox 5">
+            <a:extLst>
+              <a:ext uri="{FF2B5EF4-FFF2-40B4-BE49-F238E27FC236}">
+                <a16:creationId xmlns:a16="http://schemas.microsoft.com/office/drawing/2014/main" id="{02E5BBF4-7776-4728-84D0-5E023D329C36}"/>
               </a:ext>
             </a:extLst>
           </p:cNvPr>
@@ -3859,8 +3970,8 @@
         </p:nvSpPr>
         <p:spPr>
           <a:xfrm>
-            <a:off x="872156" y="512971"/>
-            <a:ext cx="3709469" cy="369332"/>
+            <a:off x="1217060" y="1463039"/>
+            <a:ext cx="7282047" cy="646331"/>
           </a:xfrm>
           <a:prstGeom prst="rect">
             <a:avLst/>
@@ -3875,431 +3986,55 @@
           <a:p>
             <a:r>
               <a:rPr lang="ko-KR" altLang="en-US" dirty="0"/>
-              <a:t>강사님의 개인적인 답변</a:t>
-            </a:r>
-          </a:p>
-        </p:txBody>
-      </p:sp>
-      <p:sp>
-        <p:nvSpPr>
-          <p:cNvPr id="4" name="TextBox 3">
-            <a:extLst>
-              <a:ext uri="{FF2B5EF4-FFF2-40B4-BE49-F238E27FC236}">
-                <a16:creationId xmlns:a16="http://schemas.microsoft.com/office/drawing/2014/main" id="{8520A47D-C847-411A-8B32-255DC9989927}"/>
-              </a:ext>
-            </a:extLst>
-          </p:cNvPr>
-          <p:cNvSpPr txBox="1"/>
-          <p:nvPr/>
-        </p:nvSpPr>
-        <p:spPr>
-          <a:xfrm>
-            <a:off x="5093371" y="420638"/>
-            <a:ext cx="5034012" cy="923330"/>
-          </a:xfrm>
-          <a:prstGeom prst="rect">
-            <a:avLst/>
-          </a:prstGeom>
-          <a:noFill/>
-        </p:spPr>
-        <p:txBody>
-          <a:bodyPr wrap="square" rtlCol="0">
-            <a:spAutoFit/>
-          </a:bodyPr>
-          <a:lstStyle/>
-          <a:p>
-            <a:r>
-              <a:rPr lang="ko-KR" altLang="en-US" dirty="0"/>
-              <a:t>강사님</a:t>
-            </a:r>
-            <a:endParaRPr lang="en-US" altLang="ko-KR" dirty="0"/>
-          </a:p>
-          <a:p>
-            <a:r>
-              <a:rPr lang="ko-KR" altLang="en-US" dirty="0"/>
-              <a:t>어렵</a:t>
-            </a:r>
-            <a:r>
-              <a:rPr lang="en-US" altLang="ko-KR" dirty="0"/>
-              <a:t>:</a:t>
-            </a:r>
-            <a:r>
-              <a:rPr lang="ko-KR" altLang="en-US" dirty="0"/>
-              <a:t> 너비우선탐색</a:t>
-            </a:r>
-            <a:r>
-              <a:rPr lang="en-US" altLang="ko-KR" dirty="0"/>
-              <a:t>, </a:t>
-            </a:r>
-            <a:r>
-              <a:rPr lang="ko-KR" altLang="en-US" dirty="0"/>
-              <a:t>깊이 우선탐색</a:t>
-            </a:r>
-            <a:r>
-              <a:rPr lang="en-US" altLang="ko-KR" dirty="0"/>
-              <a:t>, </a:t>
-            </a:r>
-            <a:r>
-              <a:rPr lang="ko-KR" altLang="en-US" dirty="0"/>
-              <a:t>분할정복</a:t>
-            </a:r>
-            <a:endParaRPr lang="en-US" altLang="ko-KR" dirty="0"/>
-          </a:p>
-          <a:p>
-            <a:r>
-              <a:rPr lang="ko-KR" altLang="en-US" dirty="0" err="1"/>
-              <a:t>쉽</a:t>
-            </a:r>
-            <a:r>
-              <a:rPr lang="en-US" altLang="ko-KR" dirty="0"/>
-              <a:t>: </a:t>
-            </a:r>
-            <a:r>
-              <a:rPr lang="ko-KR" altLang="en-US" dirty="0"/>
-              <a:t>사칙연산</a:t>
-            </a:r>
-            <a:r>
-              <a:rPr lang="en-US" altLang="ko-KR" dirty="0"/>
-              <a:t>, </a:t>
-            </a:r>
-            <a:r>
-              <a:rPr lang="ko-KR" altLang="en-US" dirty="0"/>
-              <a:t>정렬</a:t>
-            </a:r>
-            <a:r>
-              <a:rPr lang="en-US" altLang="ko-KR" dirty="0"/>
-              <a:t>, </a:t>
-            </a:r>
-            <a:r>
-              <a:rPr lang="ko-KR" altLang="en-US" dirty="0"/>
-              <a:t>문자열</a:t>
-            </a:r>
-            <a:endParaRPr lang="en-US" altLang="ko-KR" dirty="0"/>
-          </a:p>
-        </p:txBody>
-      </p:sp>
-      <p:pic>
-        <p:nvPicPr>
-          <p:cNvPr id="8" name="그림 7">
-            <a:extLst>
-              <a:ext uri="{FF2B5EF4-FFF2-40B4-BE49-F238E27FC236}">
-                <a16:creationId xmlns:a16="http://schemas.microsoft.com/office/drawing/2014/main" id="{1E6C565C-546D-45C5-99FF-840B6B8AD351}"/>
-              </a:ext>
-            </a:extLst>
-          </p:cNvPr>
-          <p:cNvPicPr>
-            <a:picLocks noChangeAspect="1"/>
-          </p:cNvPicPr>
-          <p:nvPr/>
-        </p:nvPicPr>
-        <p:blipFill>
-          <a:blip r:embed="rId2">
-            <a:extLst>
-              <a:ext uri="{28A0092B-C50C-407E-A947-70E740481C1C}">
-                <a14:useLocalDpi xmlns:a14="http://schemas.microsoft.com/office/drawing/2010/main" val="0"/>
-              </a:ext>
-            </a:extLst>
-          </a:blip>
-          <a:stretch>
-            <a:fillRect/>
-          </a:stretch>
-        </p:blipFill>
-        <p:spPr>
-          <a:xfrm>
-            <a:off x="526180" y="1754553"/>
-            <a:ext cx="3146327" cy="1755502"/>
-          </a:xfrm>
-          <a:prstGeom prst="rect">
-            <a:avLst/>
-          </a:prstGeom>
-        </p:spPr>
-      </p:pic>
-      <p:pic>
-        <p:nvPicPr>
-          <p:cNvPr id="10" name="그림 9">
-            <a:extLst>
-              <a:ext uri="{FF2B5EF4-FFF2-40B4-BE49-F238E27FC236}">
-                <a16:creationId xmlns:a16="http://schemas.microsoft.com/office/drawing/2014/main" id="{3E0CA239-E6CF-4192-BC47-65FAFC2DD07E}"/>
-              </a:ext>
-            </a:extLst>
-          </p:cNvPr>
-          <p:cNvPicPr>
-            <a:picLocks noChangeAspect="1"/>
-          </p:cNvPicPr>
-          <p:nvPr/>
-        </p:nvPicPr>
-        <p:blipFill>
-          <a:blip r:embed="rId3">
-            <a:extLst>
-              <a:ext uri="{28A0092B-C50C-407E-A947-70E740481C1C}">
-                <a14:useLocalDpi xmlns:a14="http://schemas.microsoft.com/office/drawing/2010/main" val="0"/>
-              </a:ext>
-            </a:extLst>
-          </a:blip>
-          <a:stretch>
-            <a:fillRect/>
-          </a:stretch>
-        </p:blipFill>
-        <p:spPr>
-          <a:xfrm>
-            <a:off x="4068278" y="1754552"/>
-            <a:ext cx="3146328" cy="1755503"/>
-          </a:xfrm>
-          <a:prstGeom prst="rect">
-            <a:avLst/>
-          </a:prstGeom>
-        </p:spPr>
-      </p:pic>
-      <p:pic>
-        <p:nvPicPr>
-          <p:cNvPr id="12" name="그림 11">
-            <a:extLst>
-              <a:ext uri="{FF2B5EF4-FFF2-40B4-BE49-F238E27FC236}">
-                <a16:creationId xmlns:a16="http://schemas.microsoft.com/office/drawing/2014/main" id="{64C681E2-E880-48F4-83E9-F03A5379EA1B}"/>
-              </a:ext>
-            </a:extLst>
-          </p:cNvPr>
-          <p:cNvPicPr>
-            <a:picLocks noChangeAspect="1"/>
-          </p:cNvPicPr>
-          <p:nvPr/>
-        </p:nvPicPr>
-        <p:blipFill>
-          <a:blip r:embed="rId4">
-            <a:extLst>
-              <a:ext uri="{28A0092B-C50C-407E-A947-70E740481C1C}">
-                <a14:useLocalDpi xmlns:a14="http://schemas.microsoft.com/office/drawing/2010/main" val="0"/>
-              </a:ext>
-            </a:extLst>
-          </a:blip>
-          <a:stretch>
-            <a:fillRect/>
-          </a:stretch>
-        </p:blipFill>
-        <p:spPr>
-          <a:xfrm>
-            <a:off x="7610377" y="1754552"/>
-            <a:ext cx="3146328" cy="1755503"/>
-          </a:xfrm>
-          <a:prstGeom prst="rect">
-            <a:avLst/>
-          </a:prstGeom>
-        </p:spPr>
-      </p:pic>
-      <p:pic>
-        <p:nvPicPr>
-          <p:cNvPr id="5" name="그림 4">
-            <a:extLst>
-              <a:ext uri="{FF2B5EF4-FFF2-40B4-BE49-F238E27FC236}">
-                <a16:creationId xmlns:a16="http://schemas.microsoft.com/office/drawing/2014/main" id="{D6EEB473-F0C8-495E-9514-A0943D5FE45C}"/>
-              </a:ext>
-            </a:extLst>
-          </p:cNvPr>
-          <p:cNvPicPr>
-            <a:picLocks noChangeAspect="1"/>
-          </p:cNvPicPr>
-          <p:nvPr/>
-        </p:nvPicPr>
-        <p:blipFill>
-          <a:blip r:embed="rId5">
-            <a:extLst>
-              <a:ext uri="{28A0092B-C50C-407E-A947-70E740481C1C}">
-                <a14:useLocalDpi xmlns:a14="http://schemas.microsoft.com/office/drawing/2010/main" val="0"/>
-              </a:ext>
-            </a:extLst>
-          </a:blip>
-          <a:stretch>
-            <a:fillRect/>
-          </a:stretch>
-        </p:blipFill>
-        <p:spPr>
-          <a:xfrm>
-            <a:off x="7736539" y="4073850"/>
-            <a:ext cx="3146330" cy="1755504"/>
-          </a:xfrm>
-          <a:prstGeom prst="rect">
-            <a:avLst/>
-          </a:prstGeom>
-        </p:spPr>
-      </p:pic>
-      <p:pic>
-        <p:nvPicPr>
-          <p:cNvPr id="9" name="그림 8">
-            <a:extLst>
-              <a:ext uri="{FF2B5EF4-FFF2-40B4-BE49-F238E27FC236}">
-                <a16:creationId xmlns:a16="http://schemas.microsoft.com/office/drawing/2014/main" id="{835CB000-53E3-4FD8-90C9-10454B4F392F}"/>
-              </a:ext>
-            </a:extLst>
-          </p:cNvPr>
-          <p:cNvPicPr>
-            <a:picLocks noChangeAspect="1"/>
-          </p:cNvPicPr>
-          <p:nvPr/>
-        </p:nvPicPr>
-        <p:blipFill>
-          <a:blip r:embed="rId6">
-            <a:extLst>
-              <a:ext uri="{28A0092B-C50C-407E-A947-70E740481C1C}">
-                <a14:useLocalDpi xmlns:a14="http://schemas.microsoft.com/office/drawing/2010/main" val="0"/>
-              </a:ext>
-            </a:extLst>
-          </a:blip>
-          <a:stretch>
-            <a:fillRect/>
-          </a:stretch>
-        </p:blipFill>
-        <p:spPr>
-          <a:xfrm>
-            <a:off x="655554" y="4073852"/>
-            <a:ext cx="3146327" cy="1755502"/>
-          </a:xfrm>
-          <a:prstGeom prst="rect">
-            <a:avLst/>
-          </a:prstGeom>
-        </p:spPr>
-      </p:pic>
-      <p:pic>
-        <p:nvPicPr>
-          <p:cNvPr id="13" name="그림 12">
-            <a:extLst>
-              <a:ext uri="{FF2B5EF4-FFF2-40B4-BE49-F238E27FC236}">
-                <a16:creationId xmlns:a16="http://schemas.microsoft.com/office/drawing/2014/main" id="{3F092BF0-310B-45AF-A3A3-FB87E72A84C9}"/>
-              </a:ext>
-            </a:extLst>
-          </p:cNvPr>
-          <p:cNvPicPr>
-            <a:picLocks noChangeAspect="1"/>
-          </p:cNvPicPr>
-          <p:nvPr/>
-        </p:nvPicPr>
-        <p:blipFill>
-          <a:blip r:embed="rId7">
-            <a:extLst>
-              <a:ext uri="{28A0092B-C50C-407E-A947-70E740481C1C}">
-                <a14:useLocalDpi xmlns:a14="http://schemas.microsoft.com/office/drawing/2010/main" val="0"/>
-              </a:ext>
-            </a:extLst>
-          </a:blip>
-          <a:stretch>
-            <a:fillRect/>
-          </a:stretch>
-        </p:blipFill>
-        <p:spPr>
-          <a:xfrm>
-            <a:off x="4122725" y="4073852"/>
-            <a:ext cx="3146330" cy="1755504"/>
-          </a:xfrm>
-          <a:prstGeom prst="rect">
-            <a:avLst/>
-          </a:prstGeom>
-        </p:spPr>
-      </p:pic>
-      <p:sp>
-        <p:nvSpPr>
-          <p:cNvPr id="15" name="TextBox 14">
-            <a:extLst>
-              <a:ext uri="{FF2B5EF4-FFF2-40B4-BE49-F238E27FC236}">
-                <a16:creationId xmlns:a16="http://schemas.microsoft.com/office/drawing/2014/main" id="{3C2B525C-CFDF-43C3-A316-A5A46A320615}"/>
-              </a:ext>
-            </a:extLst>
-          </p:cNvPr>
-          <p:cNvSpPr txBox="1"/>
-          <p:nvPr/>
-        </p:nvSpPr>
-        <p:spPr>
-          <a:xfrm>
-            <a:off x="2571600" y="5975697"/>
-            <a:ext cx="7048800" cy="369332"/>
-          </a:xfrm>
-          <a:prstGeom prst="rect">
-            <a:avLst/>
-          </a:prstGeom>
-          <a:noFill/>
-        </p:spPr>
-        <p:txBody>
-          <a:bodyPr wrap="square" rtlCol="0">
-            <a:spAutoFit/>
-          </a:bodyPr>
-          <a:lstStyle/>
-          <a:p>
+              <a:t>평균 </a:t>
+            </a:r>
             <a:r>
               <a:rPr lang="ko-KR" altLang="en-US" dirty="0" err="1"/>
               <a:t>정답율</a:t>
             </a:r>
             <a:r>
               <a:rPr lang="ko-KR" altLang="en-US" dirty="0"/>
-              <a:t> </a:t>
+              <a:t> 제일 높은 알고리즘의 문제 보여주기</a:t>
             </a:r>
             <a:r>
               <a:rPr lang="en-US" altLang="ko-KR" dirty="0"/>
-              <a:t>70% </a:t>
+              <a:t>-</a:t>
             </a:r>
             <a:r>
               <a:rPr lang="ko-KR" altLang="en-US" dirty="0"/>
-              <a:t>이상인 문제의 비율이 현저히 높은 것을 알 수 있다</a:t>
-            </a:r>
+              <a:t>캡처</a:t>
+            </a:r>
+            <a:endParaRPr lang="en-US" altLang="ko-KR" dirty="0"/>
+          </a:p>
+          <a:p>
             <a:r>
               <a:rPr lang="en-US" altLang="ko-KR" dirty="0"/>
-              <a:t>.</a:t>
-            </a:r>
-          </a:p>
-        </p:txBody>
-      </p:sp>
-      <p:sp>
-        <p:nvSpPr>
-          <p:cNvPr id="17" name="TextBox 16">
-            <a:extLst>
-              <a:ext uri="{FF2B5EF4-FFF2-40B4-BE49-F238E27FC236}">
-                <a16:creationId xmlns:a16="http://schemas.microsoft.com/office/drawing/2014/main" id="{C1A06DFA-073C-423A-9306-905DCE72C191}"/>
-              </a:ext>
-            </a:extLst>
-          </p:cNvPr>
-          <p:cNvSpPr txBox="1"/>
-          <p:nvPr/>
-        </p:nvSpPr>
-        <p:spPr>
-          <a:xfrm>
-            <a:off x="2571600" y="3558175"/>
-            <a:ext cx="7048800" cy="369332"/>
-          </a:xfrm>
-          <a:prstGeom prst="rect">
-            <a:avLst/>
-          </a:prstGeom>
-          <a:noFill/>
-        </p:spPr>
-        <p:txBody>
-          <a:bodyPr wrap="square" rtlCol="0">
-            <a:spAutoFit/>
-          </a:bodyPr>
-          <a:lstStyle/>
-          <a:p>
-            <a:r>
-              <a:rPr lang="ko-KR" altLang="en-US" dirty="0" err="1"/>
-              <a:t>정답율</a:t>
+              <a:t>(</a:t>
             </a:r>
             <a:r>
               <a:rPr lang="ko-KR" altLang="en-US" dirty="0"/>
-              <a:t> </a:t>
+              <a:t>풀어봤더니 파이썬 기초를 가지고 풀 수 있었다</a:t>
             </a:r>
             <a:r>
               <a:rPr lang="en-US" altLang="ko-KR" dirty="0"/>
-              <a:t>40% </a:t>
+              <a:t>. </a:t>
             </a:r>
             <a:r>
               <a:rPr lang="ko-KR" altLang="en-US" dirty="0"/>
-              <a:t>이하 문제의 비율이 현저히 높은 것을 알 수 있다</a:t>
+              <a:t>어렵지 않았음</a:t>
             </a:r>
             <a:r>
               <a:rPr lang="en-US" altLang="ko-KR" dirty="0"/>
-              <a:t>.</a:t>
-            </a:r>
+              <a:t>)</a:t>
+            </a:r>
+            <a:endParaRPr lang="ko-KR" altLang="en-US" dirty="0"/>
           </a:p>
         </p:txBody>
       </p:sp>
     </p:spTree>
     <p:extLst>
       <p:ext uri="{BB962C8B-B14F-4D97-AF65-F5344CB8AC3E}">
-        <p14:creationId xmlns:p14="http://schemas.microsoft.com/office/powerpoint/2010/main" val="2859032115"/>
+        <p14:creationId xmlns:p14="http://schemas.microsoft.com/office/powerpoint/2010/main" val="1961210455"/>
       </p:ext>
     </p:extLst>
   </p:cSld>
@@ -4328,6 +4063,584 @@
       </p:grpSpPr>
       <p:sp>
         <p:nvSpPr>
+          <p:cNvPr id="6" name="TextBox 5">
+            <a:extLst>
+              <a:ext uri="{FF2B5EF4-FFF2-40B4-BE49-F238E27FC236}">
+                <a16:creationId xmlns:a16="http://schemas.microsoft.com/office/drawing/2014/main" id="{02E5BBF4-7776-4728-84D0-5E023D329C36}"/>
+              </a:ext>
+            </a:extLst>
+          </p:cNvPr>
+          <p:cNvSpPr txBox="1"/>
+          <p:nvPr/>
+        </p:nvSpPr>
+        <p:spPr>
+          <a:xfrm>
+            <a:off x="1217060" y="1463039"/>
+            <a:ext cx="5963385" cy="646331"/>
+          </a:xfrm>
+          <a:prstGeom prst="rect">
+            <a:avLst/>
+          </a:prstGeom>
+          <a:noFill/>
+        </p:spPr>
+        <p:txBody>
+          <a:bodyPr wrap="square" rtlCol="0">
+            <a:spAutoFit/>
+          </a:bodyPr>
+          <a:lstStyle/>
+          <a:p>
+            <a:r>
+              <a:rPr lang="ko-KR" altLang="en-US" dirty="0"/>
+              <a:t>평균 </a:t>
+            </a:r>
+            <a:r>
+              <a:rPr lang="ko-KR" altLang="en-US" dirty="0" err="1"/>
+              <a:t>정답율</a:t>
+            </a:r>
+            <a:r>
+              <a:rPr lang="ko-KR" altLang="en-US" dirty="0"/>
+              <a:t> 제일 낮은 알고리즘의 문제 보여주기</a:t>
+            </a:r>
+            <a:r>
+              <a:rPr lang="en-US" altLang="ko-KR" dirty="0"/>
+              <a:t>-</a:t>
+            </a:r>
+            <a:r>
+              <a:rPr lang="ko-KR" altLang="en-US" dirty="0"/>
+              <a:t>캡처</a:t>
+            </a:r>
+            <a:endParaRPr lang="en-US" altLang="ko-KR" dirty="0"/>
+          </a:p>
+          <a:p>
+            <a:r>
+              <a:rPr lang="en-US" altLang="ko-KR" dirty="0"/>
+              <a:t>(</a:t>
+            </a:r>
+            <a:r>
+              <a:rPr lang="ko-KR" altLang="en-US" dirty="0"/>
+              <a:t>너무 어려워요</a:t>
+            </a:r>
+            <a:r>
+              <a:rPr lang="en-US" altLang="ko-KR" dirty="0"/>
+              <a:t>)</a:t>
+            </a:r>
+            <a:endParaRPr lang="ko-KR" altLang="en-US" dirty="0"/>
+          </a:p>
+        </p:txBody>
+      </p:sp>
+    </p:spTree>
+    <p:extLst>
+      <p:ext uri="{BB962C8B-B14F-4D97-AF65-F5344CB8AC3E}">
+        <p14:creationId xmlns:p14="http://schemas.microsoft.com/office/powerpoint/2010/main" val="2453587499"/>
+      </p:ext>
+    </p:extLst>
+  </p:cSld>
+  <p:clrMapOvr>
+    <a:masterClrMapping/>
+  </p:clrMapOvr>
+</p:sld>
+</file>
+
+<file path=ppt/slides/slide16.xml><?xml version="1.0" encoding="utf-8"?>
+<p:sld xmlns:a="http://schemas.openxmlformats.org/drawingml/2006/main" xmlns:r="http://schemas.openxmlformats.org/officeDocument/2006/relationships" xmlns:p="http://schemas.openxmlformats.org/presentationml/2006/main">
+  <p:cSld>
+    <p:spTree>
+      <p:nvGrpSpPr>
+        <p:cNvPr id="1" name=""/>
+        <p:cNvGrpSpPr/>
+        <p:nvPr/>
+      </p:nvGrpSpPr>
+      <p:grpSpPr>
+        <a:xfrm>
+          <a:off x="0" y="0"/>
+          <a:ext cx="0" cy="0"/>
+          <a:chOff x="0" y="0"/>
+          <a:chExt cx="0" cy="0"/>
+        </a:xfrm>
+      </p:grpSpPr>
+      <p:sp>
+        <p:nvSpPr>
+          <p:cNvPr id="2" name="TextBox 1">
+            <a:extLst>
+              <a:ext uri="{FF2B5EF4-FFF2-40B4-BE49-F238E27FC236}">
+                <a16:creationId xmlns:a16="http://schemas.microsoft.com/office/drawing/2014/main" id="{BC1C2F49-ADD0-44F2-B739-4AC4205D5D85}"/>
+              </a:ext>
+            </a:extLst>
+          </p:cNvPr>
+          <p:cNvSpPr txBox="1"/>
+          <p:nvPr/>
+        </p:nvSpPr>
+        <p:spPr>
+          <a:xfrm>
+            <a:off x="872156" y="512971"/>
+            <a:ext cx="3709469" cy="369332"/>
+          </a:xfrm>
+          <a:prstGeom prst="rect">
+            <a:avLst/>
+          </a:prstGeom>
+          <a:noFill/>
+        </p:spPr>
+        <p:txBody>
+          <a:bodyPr wrap="square" rtlCol="0">
+            <a:spAutoFit/>
+          </a:bodyPr>
+          <a:lstStyle/>
+          <a:p>
+            <a:r>
+              <a:rPr lang="ko-KR" altLang="en-US" dirty="0"/>
+              <a:t>강사님의 개인적인 답변</a:t>
+            </a:r>
+          </a:p>
+        </p:txBody>
+      </p:sp>
+      <p:sp>
+        <p:nvSpPr>
+          <p:cNvPr id="4" name="TextBox 3">
+            <a:extLst>
+              <a:ext uri="{FF2B5EF4-FFF2-40B4-BE49-F238E27FC236}">
+                <a16:creationId xmlns:a16="http://schemas.microsoft.com/office/drawing/2014/main" id="{8520A47D-C847-411A-8B32-255DC9989927}"/>
+              </a:ext>
+            </a:extLst>
+          </p:cNvPr>
+          <p:cNvSpPr txBox="1"/>
+          <p:nvPr/>
+        </p:nvSpPr>
+        <p:spPr>
+          <a:xfrm>
+            <a:off x="5093371" y="420638"/>
+            <a:ext cx="5034012" cy="923330"/>
+          </a:xfrm>
+          <a:prstGeom prst="rect">
+            <a:avLst/>
+          </a:prstGeom>
+          <a:noFill/>
+        </p:spPr>
+        <p:txBody>
+          <a:bodyPr wrap="square" rtlCol="0">
+            <a:spAutoFit/>
+          </a:bodyPr>
+          <a:lstStyle/>
+          <a:p>
+            <a:r>
+              <a:rPr lang="ko-KR" altLang="en-US" dirty="0"/>
+              <a:t>강사님</a:t>
+            </a:r>
+            <a:endParaRPr lang="en-US" altLang="ko-KR" dirty="0"/>
+          </a:p>
+          <a:p>
+            <a:r>
+              <a:rPr lang="ko-KR" altLang="en-US" dirty="0"/>
+              <a:t>어렵</a:t>
+            </a:r>
+            <a:r>
+              <a:rPr lang="en-US" altLang="ko-KR" dirty="0"/>
+              <a:t>:</a:t>
+            </a:r>
+            <a:r>
+              <a:rPr lang="ko-KR" altLang="en-US" dirty="0"/>
+              <a:t> 너비우선탐색</a:t>
+            </a:r>
+            <a:r>
+              <a:rPr lang="en-US" altLang="ko-KR" dirty="0"/>
+              <a:t>, </a:t>
+            </a:r>
+            <a:r>
+              <a:rPr lang="ko-KR" altLang="en-US" dirty="0"/>
+              <a:t>깊이 우선탐색</a:t>
+            </a:r>
+            <a:r>
+              <a:rPr lang="en-US" altLang="ko-KR" dirty="0"/>
+              <a:t>, </a:t>
+            </a:r>
+            <a:r>
+              <a:rPr lang="ko-KR" altLang="en-US" dirty="0"/>
+              <a:t>분할정복</a:t>
+            </a:r>
+            <a:endParaRPr lang="en-US" altLang="ko-KR" dirty="0"/>
+          </a:p>
+          <a:p>
+            <a:r>
+              <a:rPr lang="ko-KR" altLang="en-US" dirty="0" err="1"/>
+              <a:t>쉽</a:t>
+            </a:r>
+            <a:r>
+              <a:rPr lang="en-US" altLang="ko-KR" dirty="0"/>
+              <a:t>: </a:t>
+            </a:r>
+            <a:r>
+              <a:rPr lang="ko-KR" altLang="en-US" dirty="0"/>
+              <a:t>사칙연산</a:t>
+            </a:r>
+            <a:r>
+              <a:rPr lang="en-US" altLang="ko-KR" dirty="0"/>
+              <a:t>, </a:t>
+            </a:r>
+            <a:r>
+              <a:rPr lang="ko-KR" altLang="en-US" dirty="0"/>
+              <a:t>정렬</a:t>
+            </a:r>
+            <a:r>
+              <a:rPr lang="en-US" altLang="ko-KR" dirty="0"/>
+              <a:t>, </a:t>
+            </a:r>
+            <a:r>
+              <a:rPr lang="ko-KR" altLang="en-US" dirty="0"/>
+              <a:t>문자열</a:t>
+            </a:r>
+            <a:endParaRPr lang="en-US" altLang="ko-KR" dirty="0"/>
+          </a:p>
+        </p:txBody>
+      </p:sp>
+      <p:pic>
+        <p:nvPicPr>
+          <p:cNvPr id="8" name="그림 7">
+            <a:extLst>
+              <a:ext uri="{FF2B5EF4-FFF2-40B4-BE49-F238E27FC236}">
+                <a16:creationId xmlns:a16="http://schemas.microsoft.com/office/drawing/2014/main" id="{1E6C565C-546D-45C5-99FF-840B6B8AD351}"/>
+              </a:ext>
+            </a:extLst>
+          </p:cNvPr>
+          <p:cNvPicPr>
+            <a:picLocks noChangeAspect="1"/>
+          </p:cNvPicPr>
+          <p:nvPr/>
+        </p:nvPicPr>
+        <p:blipFill>
+          <a:blip r:embed="rId2">
+            <a:extLst>
+              <a:ext uri="{28A0092B-C50C-407E-A947-70E740481C1C}">
+                <a14:useLocalDpi xmlns:a14="http://schemas.microsoft.com/office/drawing/2010/main" val="0"/>
+              </a:ext>
+            </a:extLst>
+          </a:blip>
+          <a:stretch>
+            <a:fillRect/>
+          </a:stretch>
+        </p:blipFill>
+        <p:spPr>
+          <a:xfrm>
+            <a:off x="526180" y="1754553"/>
+            <a:ext cx="3146327" cy="1755502"/>
+          </a:xfrm>
+          <a:prstGeom prst="rect">
+            <a:avLst/>
+          </a:prstGeom>
+        </p:spPr>
+      </p:pic>
+      <p:pic>
+        <p:nvPicPr>
+          <p:cNvPr id="10" name="그림 9">
+            <a:extLst>
+              <a:ext uri="{FF2B5EF4-FFF2-40B4-BE49-F238E27FC236}">
+                <a16:creationId xmlns:a16="http://schemas.microsoft.com/office/drawing/2014/main" id="{3E0CA239-E6CF-4192-BC47-65FAFC2DD07E}"/>
+              </a:ext>
+            </a:extLst>
+          </p:cNvPr>
+          <p:cNvPicPr>
+            <a:picLocks noChangeAspect="1"/>
+          </p:cNvPicPr>
+          <p:nvPr/>
+        </p:nvPicPr>
+        <p:blipFill>
+          <a:blip r:embed="rId3">
+            <a:extLst>
+              <a:ext uri="{28A0092B-C50C-407E-A947-70E740481C1C}">
+                <a14:useLocalDpi xmlns:a14="http://schemas.microsoft.com/office/drawing/2010/main" val="0"/>
+              </a:ext>
+            </a:extLst>
+          </a:blip>
+          <a:stretch>
+            <a:fillRect/>
+          </a:stretch>
+        </p:blipFill>
+        <p:spPr>
+          <a:xfrm>
+            <a:off x="4068278" y="1754552"/>
+            <a:ext cx="3146328" cy="1755503"/>
+          </a:xfrm>
+          <a:prstGeom prst="rect">
+            <a:avLst/>
+          </a:prstGeom>
+        </p:spPr>
+      </p:pic>
+      <p:pic>
+        <p:nvPicPr>
+          <p:cNvPr id="12" name="그림 11">
+            <a:extLst>
+              <a:ext uri="{FF2B5EF4-FFF2-40B4-BE49-F238E27FC236}">
+                <a16:creationId xmlns:a16="http://schemas.microsoft.com/office/drawing/2014/main" id="{64C681E2-E880-48F4-83E9-F03A5379EA1B}"/>
+              </a:ext>
+            </a:extLst>
+          </p:cNvPr>
+          <p:cNvPicPr>
+            <a:picLocks noChangeAspect="1"/>
+          </p:cNvPicPr>
+          <p:nvPr/>
+        </p:nvPicPr>
+        <p:blipFill>
+          <a:blip r:embed="rId4">
+            <a:extLst>
+              <a:ext uri="{28A0092B-C50C-407E-A947-70E740481C1C}">
+                <a14:useLocalDpi xmlns:a14="http://schemas.microsoft.com/office/drawing/2010/main" val="0"/>
+              </a:ext>
+            </a:extLst>
+          </a:blip>
+          <a:stretch>
+            <a:fillRect/>
+          </a:stretch>
+        </p:blipFill>
+        <p:spPr>
+          <a:xfrm>
+            <a:off x="7610377" y="1754552"/>
+            <a:ext cx="3146328" cy="1755503"/>
+          </a:xfrm>
+          <a:prstGeom prst="rect">
+            <a:avLst/>
+          </a:prstGeom>
+        </p:spPr>
+      </p:pic>
+      <p:pic>
+        <p:nvPicPr>
+          <p:cNvPr id="5" name="그림 4">
+            <a:extLst>
+              <a:ext uri="{FF2B5EF4-FFF2-40B4-BE49-F238E27FC236}">
+                <a16:creationId xmlns:a16="http://schemas.microsoft.com/office/drawing/2014/main" id="{D6EEB473-F0C8-495E-9514-A0943D5FE45C}"/>
+              </a:ext>
+            </a:extLst>
+          </p:cNvPr>
+          <p:cNvPicPr>
+            <a:picLocks noChangeAspect="1"/>
+          </p:cNvPicPr>
+          <p:nvPr/>
+        </p:nvPicPr>
+        <p:blipFill>
+          <a:blip r:embed="rId5">
+            <a:extLst>
+              <a:ext uri="{28A0092B-C50C-407E-A947-70E740481C1C}">
+                <a14:useLocalDpi xmlns:a14="http://schemas.microsoft.com/office/drawing/2010/main" val="0"/>
+              </a:ext>
+            </a:extLst>
+          </a:blip>
+          <a:stretch>
+            <a:fillRect/>
+          </a:stretch>
+        </p:blipFill>
+        <p:spPr>
+          <a:xfrm>
+            <a:off x="7736539" y="4073850"/>
+            <a:ext cx="3146330" cy="1755504"/>
+          </a:xfrm>
+          <a:prstGeom prst="rect">
+            <a:avLst/>
+          </a:prstGeom>
+        </p:spPr>
+      </p:pic>
+      <p:pic>
+        <p:nvPicPr>
+          <p:cNvPr id="9" name="그림 8">
+            <a:extLst>
+              <a:ext uri="{FF2B5EF4-FFF2-40B4-BE49-F238E27FC236}">
+                <a16:creationId xmlns:a16="http://schemas.microsoft.com/office/drawing/2014/main" id="{835CB000-53E3-4FD8-90C9-10454B4F392F}"/>
+              </a:ext>
+            </a:extLst>
+          </p:cNvPr>
+          <p:cNvPicPr>
+            <a:picLocks noChangeAspect="1"/>
+          </p:cNvPicPr>
+          <p:nvPr/>
+        </p:nvPicPr>
+        <p:blipFill>
+          <a:blip r:embed="rId6">
+            <a:extLst>
+              <a:ext uri="{28A0092B-C50C-407E-A947-70E740481C1C}">
+                <a14:useLocalDpi xmlns:a14="http://schemas.microsoft.com/office/drawing/2010/main" val="0"/>
+              </a:ext>
+            </a:extLst>
+          </a:blip>
+          <a:stretch>
+            <a:fillRect/>
+          </a:stretch>
+        </p:blipFill>
+        <p:spPr>
+          <a:xfrm>
+            <a:off x="655554" y="4073852"/>
+            <a:ext cx="3146327" cy="1755502"/>
+          </a:xfrm>
+          <a:prstGeom prst="rect">
+            <a:avLst/>
+          </a:prstGeom>
+        </p:spPr>
+      </p:pic>
+      <p:pic>
+        <p:nvPicPr>
+          <p:cNvPr id="13" name="그림 12">
+            <a:extLst>
+              <a:ext uri="{FF2B5EF4-FFF2-40B4-BE49-F238E27FC236}">
+                <a16:creationId xmlns:a16="http://schemas.microsoft.com/office/drawing/2014/main" id="{3F092BF0-310B-45AF-A3A3-FB87E72A84C9}"/>
+              </a:ext>
+            </a:extLst>
+          </p:cNvPr>
+          <p:cNvPicPr>
+            <a:picLocks noChangeAspect="1"/>
+          </p:cNvPicPr>
+          <p:nvPr/>
+        </p:nvPicPr>
+        <p:blipFill>
+          <a:blip r:embed="rId7">
+            <a:extLst>
+              <a:ext uri="{28A0092B-C50C-407E-A947-70E740481C1C}">
+                <a14:useLocalDpi xmlns:a14="http://schemas.microsoft.com/office/drawing/2010/main" val="0"/>
+              </a:ext>
+            </a:extLst>
+          </a:blip>
+          <a:stretch>
+            <a:fillRect/>
+          </a:stretch>
+        </p:blipFill>
+        <p:spPr>
+          <a:xfrm>
+            <a:off x="4122725" y="4073852"/>
+            <a:ext cx="3146330" cy="1755504"/>
+          </a:xfrm>
+          <a:prstGeom prst="rect">
+            <a:avLst/>
+          </a:prstGeom>
+        </p:spPr>
+      </p:pic>
+      <p:sp>
+        <p:nvSpPr>
+          <p:cNvPr id="15" name="TextBox 14">
+            <a:extLst>
+              <a:ext uri="{FF2B5EF4-FFF2-40B4-BE49-F238E27FC236}">
+                <a16:creationId xmlns:a16="http://schemas.microsoft.com/office/drawing/2014/main" id="{3C2B525C-CFDF-43C3-A316-A5A46A320615}"/>
+              </a:ext>
+            </a:extLst>
+          </p:cNvPr>
+          <p:cNvSpPr txBox="1"/>
+          <p:nvPr/>
+        </p:nvSpPr>
+        <p:spPr>
+          <a:xfrm>
+            <a:off x="2571600" y="5975697"/>
+            <a:ext cx="7048800" cy="369332"/>
+          </a:xfrm>
+          <a:prstGeom prst="rect">
+            <a:avLst/>
+          </a:prstGeom>
+          <a:noFill/>
+        </p:spPr>
+        <p:txBody>
+          <a:bodyPr wrap="square" rtlCol="0">
+            <a:spAutoFit/>
+          </a:bodyPr>
+          <a:lstStyle/>
+          <a:p>
+            <a:r>
+              <a:rPr lang="ko-KR" altLang="en-US" dirty="0" err="1"/>
+              <a:t>정답율</a:t>
+            </a:r>
+            <a:r>
+              <a:rPr lang="ko-KR" altLang="en-US" dirty="0"/>
+              <a:t> </a:t>
+            </a:r>
+            <a:r>
+              <a:rPr lang="en-US" altLang="ko-KR" dirty="0"/>
+              <a:t>70% </a:t>
+            </a:r>
+            <a:r>
+              <a:rPr lang="ko-KR" altLang="en-US" dirty="0"/>
+              <a:t>이상인 문제의 비율이 현저히 높은 것을 알 수 있다</a:t>
+            </a:r>
+            <a:r>
+              <a:rPr lang="en-US" altLang="ko-KR" dirty="0"/>
+              <a:t>.</a:t>
+            </a:r>
+          </a:p>
+        </p:txBody>
+      </p:sp>
+      <p:sp>
+        <p:nvSpPr>
+          <p:cNvPr id="17" name="TextBox 16">
+            <a:extLst>
+              <a:ext uri="{FF2B5EF4-FFF2-40B4-BE49-F238E27FC236}">
+                <a16:creationId xmlns:a16="http://schemas.microsoft.com/office/drawing/2014/main" id="{C1A06DFA-073C-423A-9306-905DCE72C191}"/>
+              </a:ext>
+            </a:extLst>
+          </p:cNvPr>
+          <p:cNvSpPr txBox="1"/>
+          <p:nvPr/>
+        </p:nvSpPr>
+        <p:spPr>
+          <a:xfrm>
+            <a:off x="2571600" y="3558175"/>
+            <a:ext cx="7048800" cy="369332"/>
+          </a:xfrm>
+          <a:prstGeom prst="rect">
+            <a:avLst/>
+          </a:prstGeom>
+          <a:noFill/>
+        </p:spPr>
+        <p:txBody>
+          <a:bodyPr wrap="square" rtlCol="0">
+            <a:spAutoFit/>
+          </a:bodyPr>
+          <a:lstStyle/>
+          <a:p>
+            <a:r>
+              <a:rPr lang="ko-KR" altLang="en-US" dirty="0" err="1"/>
+              <a:t>정답율</a:t>
+            </a:r>
+            <a:r>
+              <a:rPr lang="ko-KR" altLang="en-US" dirty="0"/>
+              <a:t> </a:t>
+            </a:r>
+            <a:r>
+              <a:rPr lang="en-US" altLang="ko-KR" dirty="0"/>
+              <a:t>40% </a:t>
+            </a:r>
+            <a:r>
+              <a:rPr lang="ko-KR" altLang="en-US" dirty="0"/>
+              <a:t>이하 문제의 비율이 현저히 높은 것을 알 수 있다</a:t>
+            </a:r>
+            <a:r>
+              <a:rPr lang="en-US" altLang="ko-KR" dirty="0"/>
+              <a:t>.</a:t>
+            </a:r>
+          </a:p>
+        </p:txBody>
+      </p:sp>
+    </p:spTree>
+    <p:extLst>
+      <p:ext uri="{BB962C8B-B14F-4D97-AF65-F5344CB8AC3E}">
+        <p14:creationId xmlns:p14="http://schemas.microsoft.com/office/powerpoint/2010/main" val="2859032115"/>
+      </p:ext>
+    </p:extLst>
+  </p:cSld>
+  <p:clrMapOvr>
+    <a:masterClrMapping/>
+  </p:clrMapOvr>
+</p:sld>
+</file>
+
+<file path=ppt/slides/slide17.xml><?xml version="1.0" encoding="utf-8"?>
+<p:sld xmlns:a="http://schemas.openxmlformats.org/drawingml/2006/main" xmlns:r="http://schemas.openxmlformats.org/officeDocument/2006/relationships" xmlns:p="http://schemas.openxmlformats.org/presentationml/2006/main">
+  <p:cSld>
+    <p:spTree>
+      <p:nvGrpSpPr>
+        <p:cNvPr id="1" name=""/>
+        <p:cNvGrpSpPr/>
+        <p:nvPr/>
+      </p:nvGrpSpPr>
+      <p:grpSpPr>
+        <a:xfrm>
+          <a:off x="0" y="0"/>
+          <a:ext cx="0" cy="0"/>
+          <a:chOff x="0" y="0"/>
+          <a:chExt cx="0" cy="0"/>
+        </a:xfrm>
+      </p:grpSpPr>
+      <p:sp>
+        <p:nvSpPr>
           <p:cNvPr id="2" name="TextBox 1">
             <a:extLst>
               <a:ext uri="{FF2B5EF4-FFF2-40B4-BE49-F238E27FC236}">
@@ -4690,7 +5003,7 @@
 </p:sld>
 </file>
 
-<file path=ppt/slides/slide16.xml><?xml version="1.0" encoding="utf-8"?>
+<file path=ppt/slides/slide18.xml><?xml version="1.0" encoding="utf-8"?>
 <p:sld xmlns:a="http://schemas.openxmlformats.org/drawingml/2006/main" xmlns:r="http://schemas.openxmlformats.org/officeDocument/2006/relationships" xmlns:p="http://schemas.openxmlformats.org/presentationml/2006/main">
   <p:cSld>
     <p:spTree>
@@ -5257,8 +5570,8 @@
         </p:nvSpPr>
         <p:spPr>
           <a:xfrm>
-            <a:off x="1940560" y="914400"/>
-            <a:ext cx="6888480" cy="369332"/>
+            <a:off x="0" y="0"/>
+            <a:ext cx="2243983" cy="523220"/>
           </a:xfrm>
           <a:prstGeom prst="rect">
             <a:avLst/>
@@ -5271,14 +5584,152 @@
           </a:bodyPr>
           <a:lstStyle/>
           <a:p>
-            <a:r>
-              <a:rPr lang="ko-KR" altLang="en-US" dirty="0" err="1"/>
+            <a:pPr algn="ctr"/>
+            <a:r>
+              <a:rPr lang="ko-KR" altLang="en-US" sz="2800" dirty="0" err="1"/>
               <a:t>크롤링</a:t>
             </a:r>
             <a:r>
+              <a:rPr lang="ko-KR" altLang="en-US" sz="2800" dirty="0"/>
+              <a:t> 과정</a:t>
+            </a:r>
+          </a:p>
+        </p:txBody>
+      </p:sp>
+      <p:pic>
+        <p:nvPicPr>
+          <p:cNvPr id="2" name="그림 1">
+            <a:extLst>
+              <a:ext uri="{FF2B5EF4-FFF2-40B4-BE49-F238E27FC236}">
+                <a16:creationId xmlns:a16="http://schemas.microsoft.com/office/drawing/2014/main" id="{B5A46306-643D-41B4-8B76-D890EFADE7E8}"/>
+              </a:ext>
+            </a:extLst>
+          </p:cNvPr>
+          <p:cNvPicPr>
+            <a:picLocks noChangeAspect="1"/>
+          </p:cNvPicPr>
+          <p:nvPr/>
+        </p:nvPicPr>
+        <p:blipFill rotWithShape="1">
+          <a:blip r:embed="rId2"/>
+          <a:srcRect b="30941"/>
+          <a:stretch/>
+        </p:blipFill>
+        <p:spPr>
+          <a:xfrm>
+            <a:off x="437224" y="1288623"/>
+            <a:ext cx="4832200" cy="1547567"/>
+          </a:xfrm>
+          <a:prstGeom prst="rect">
+            <a:avLst/>
+          </a:prstGeom>
+        </p:spPr>
+      </p:pic>
+      <p:sp>
+        <p:nvSpPr>
+          <p:cNvPr id="3" name="TextBox 2">
+            <a:extLst>
+              <a:ext uri="{FF2B5EF4-FFF2-40B4-BE49-F238E27FC236}">
+                <a16:creationId xmlns:a16="http://schemas.microsoft.com/office/drawing/2014/main" id="{A218B62B-0B55-42F0-B0F3-64965501F9F3}"/>
+              </a:ext>
+            </a:extLst>
+          </p:cNvPr>
+          <p:cNvSpPr txBox="1"/>
+          <p:nvPr/>
+        </p:nvSpPr>
+        <p:spPr>
+          <a:xfrm>
+            <a:off x="437224" y="3059668"/>
+            <a:ext cx="2793462" cy="369332"/>
+          </a:xfrm>
+          <a:prstGeom prst="rect">
+            <a:avLst/>
+          </a:prstGeom>
+          <a:noFill/>
+        </p:spPr>
+        <p:txBody>
+          <a:bodyPr wrap="square" rtlCol="0">
+            <a:spAutoFit/>
+          </a:bodyPr>
+          <a:lstStyle/>
+          <a:p>
+            <a:r>
               <a:rPr lang="ko-KR" altLang="en-US" dirty="0"/>
-              <a:t> 과정</a:t>
-            </a:r>
+              <a:t>백준 사이트로 이동</a:t>
+            </a:r>
+          </a:p>
+        </p:txBody>
+      </p:sp>
+      <p:pic>
+        <p:nvPicPr>
+          <p:cNvPr id="6" name="그림 5">
+            <a:extLst>
+              <a:ext uri="{FF2B5EF4-FFF2-40B4-BE49-F238E27FC236}">
+                <a16:creationId xmlns:a16="http://schemas.microsoft.com/office/drawing/2014/main" id="{16B14432-9A9B-46D5-A8D4-C5DE2DB1A960}"/>
+              </a:ext>
+            </a:extLst>
+          </p:cNvPr>
+          <p:cNvPicPr>
+            <a:picLocks noChangeAspect="1"/>
+          </p:cNvPicPr>
+          <p:nvPr/>
+        </p:nvPicPr>
+        <p:blipFill rotWithShape="1">
+          <a:blip r:embed="rId3"/>
+          <a:srcRect t="2712"/>
+          <a:stretch/>
+        </p:blipFill>
+        <p:spPr>
+          <a:xfrm>
+            <a:off x="6094600" y="0"/>
+            <a:ext cx="5954643" cy="6858000"/>
+          </a:xfrm>
+          <a:prstGeom prst="rect">
+            <a:avLst/>
+          </a:prstGeom>
+        </p:spPr>
+      </p:pic>
+      <p:sp>
+        <p:nvSpPr>
+          <p:cNvPr id="7" name="화살표: 톱니 모양의 오른쪽 6">
+            <a:extLst>
+              <a:ext uri="{FF2B5EF4-FFF2-40B4-BE49-F238E27FC236}">
+                <a16:creationId xmlns:a16="http://schemas.microsoft.com/office/drawing/2014/main" id="{625F52EA-C20B-43CA-9338-6EF32C6EB478}"/>
+              </a:ext>
+            </a:extLst>
+          </p:cNvPr>
+          <p:cNvSpPr/>
+          <p:nvPr/>
+        </p:nvSpPr>
+        <p:spPr>
+          <a:xfrm>
+            <a:off x="4750231" y="2676966"/>
+            <a:ext cx="1038386" cy="765403"/>
+          </a:xfrm>
+          <a:prstGeom prst="notchedRightArrow">
+            <a:avLst/>
+          </a:prstGeom>
+        </p:spPr>
+        <p:style>
+          <a:lnRef idx="3">
+            <a:schemeClr val="lt1"/>
+          </a:lnRef>
+          <a:fillRef idx="1">
+            <a:schemeClr val="accent6"/>
+          </a:fillRef>
+          <a:effectRef idx="1">
+            <a:schemeClr val="accent6"/>
+          </a:effectRef>
+          <a:fontRef idx="minor">
+            <a:schemeClr val="lt1"/>
+          </a:fontRef>
+        </p:style>
+        <p:txBody>
+          <a:bodyPr rtlCol="0" anchor="ctr"/>
+          <a:lstStyle/>
+          <a:p>
+            <a:pPr algn="ctr"/>
+            <a:endParaRPr lang="ko-KR" altLang="en-US"/>
           </a:p>
         </p:txBody>
       </p:sp>
@@ -5326,8 +5777,8 @@
         </p:nvSpPr>
         <p:spPr>
           <a:xfrm>
-            <a:off x="1940560" y="914400"/>
-            <a:ext cx="6888480" cy="369332"/>
+            <a:off x="0" y="0"/>
+            <a:ext cx="2243983" cy="523220"/>
           </a:xfrm>
           <a:prstGeom prst="rect">
             <a:avLst/>
@@ -5340,45 +5791,537 @@
           </a:bodyPr>
           <a:lstStyle/>
           <a:p>
-            <a:r>
-              <a:rPr lang="en-US" altLang="ko-KR" dirty="0" err="1"/>
-              <a:t>Dplyr</a:t>
-            </a:r>
-            <a:r>
-              <a:rPr lang="en-US" altLang="ko-KR" dirty="0"/>
-              <a:t> </a:t>
-            </a:r>
+            <a:pPr algn="ctr"/>
+            <a:r>
+              <a:rPr lang="ko-KR" altLang="en-US" sz="2800" dirty="0" err="1"/>
+              <a:t>크롤링</a:t>
+            </a:r>
+            <a:r>
+              <a:rPr lang="ko-KR" altLang="en-US" sz="2800" dirty="0"/>
+              <a:t> 과정</a:t>
+            </a:r>
+          </a:p>
+        </p:txBody>
+      </p:sp>
+      <p:pic>
+        <p:nvPicPr>
+          <p:cNvPr id="5" name="그림 4">
+            <a:extLst>
+              <a:ext uri="{FF2B5EF4-FFF2-40B4-BE49-F238E27FC236}">
+                <a16:creationId xmlns:a16="http://schemas.microsoft.com/office/drawing/2014/main" id="{CA2CB5C3-68A8-4851-9E2C-3077E97430C5}"/>
+              </a:ext>
+            </a:extLst>
+          </p:cNvPr>
+          <p:cNvPicPr>
+            <a:picLocks noChangeAspect="1"/>
+          </p:cNvPicPr>
+          <p:nvPr/>
+        </p:nvPicPr>
+        <p:blipFill>
+          <a:blip r:embed="rId2"/>
+          <a:stretch>
+            <a:fillRect/>
+          </a:stretch>
+        </p:blipFill>
+        <p:spPr>
+          <a:xfrm>
+            <a:off x="332094" y="657681"/>
+            <a:ext cx="10752341" cy="4766726"/>
+          </a:xfrm>
+          <a:prstGeom prst="rect">
+            <a:avLst/>
+          </a:prstGeom>
+        </p:spPr>
+      </p:pic>
+      <p:sp>
+        <p:nvSpPr>
+          <p:cNvPr id="3" name="TextBox 2">
+            <a:extLst>
+              <a:ext uri="{FF2B5EF4-FFF2-40B4-BE49-F238E27FC236}">
+                <a16:creationId xmlns:a16="http://schemas.microsoft.com/office/drawing/2014/main" id="{A218B62B-0B55-42F0-B0F3-64965501F9F3}"/>
+              </a:ext>
+            </a:extLst>
+          </p:cNvPr>
+          <p:cNvSpPr txBox="1"/>
+          <p:nvPr/>
+        </p:nvSpPr>
+        <p:spPr>
+          <a:xfrm>
+            <a:off x="2816194" y="1143815"/>
+            <a:ext cx="5784139" cy="369332"/>
+          </a:xfrm>
+          <a:prstGeom prst="rect">
+            <a:avLst/>
+          </a:prstGeom>
+          <a:noFill/>
+        </p:spPr>
+        <p:txBody>
+          <a:bodyPr wrap="square" rtlCol="0">
+            <a:spAutoFit/>
+          </a:bodyPr>
+          <a:lstStyle/>
+          <a:p>
             <a:r>
               <a:rPr lang="ko-KR" altLang="en-US" dirty="0"/>
-              <a:t>패키지와 </a:t>
-            </a:r>
-            <a:r>
-              <a:rPr lang="en-US" altLang="ko-KR" dirty="0" err="1"/>
-              <a:t>ggplot</a:t>
-            </a:r>
+              <a:t>알고리즘별 태그명과 총 문제 수를 각각 변수에 저장</a:t>
+            </a:r>
+          </a:p>
+        </p:txBody>
+      </p:sp>
+      <p:sp>
+        <p:nvSpPr>
+          <p:cNvPr id="9" name="직사각형 8">
+            <a:extLst>
+              <a:ext uri="{FF2B5EF4-FFF2-40B4-BE49-F238E27FC236}">
+                <a16:creationId xmlns:a16="http://schemas.microsoft.com/office/drawing/2014/main" id="{647CC59B-832B-4E05-A79C-8BD9CE450837}"/>
+              </a:ext>
+            </a:extLst>
+          </p:cNvPr>
+          <p:cNvSpPr/>
+          <p:nvPr/>
+        </p:nvSpPr>
+        <p:spPr>
+          <a:xfrm>
+            <a:off x="3159071" y="1999281"/>
+            <a:ext cx="7925364" cy="485626"/>
+          </a:xfrm>
+          <a:prstGeom prst="rect">
+            <a:avLst/>
+          </a:prstGeom>
+          <a:noFill/>
+          <a:ln w="28575" cap="flat" cmpd="sng" algn="ctr">
+            <a:solidFill>
+              <a:schemeClr val="accent2"/>
+            </a:solidFill>
+            <a:prstDash val="solid"/>
+            <a:round/>
+            <a:headEnd type="none" w="med" len="med"/>
+            <a:tailEnd type="none" w="med" len="med"/>
+          </a:ln>
+        </p:spPr>
+        <p:style>
+          <a:lnRef idx="0">
+            <a:scrgbClr r="0" g="0" b="0"/>
+          </a:lnRef>
+          <a:fillRef idx="0">
+            <a:scrgbClr r="0" g="0" b="0"/>
+          </a:fillRef>
+          <a:effectRef idx="0">
+            <a:scrgbClr r="0" g="0" b="0"/>
+          </a:effectRef>
+          <a:fontRef idx="minor">
+            <a:schemeClr val="accent2"/>
+          </a:fontRef>
+        </p:style>
+        <p:txBody>
+          <a:bodyPr rtlCol="0" anchor="ctr"/>
+          <a:lstStyle/>
+          <a:p>
+            <a:pPr algn="ctr"/>
+            <a:endParaRPr lang="ko-KR" altLang="en-US"/>
+          </a:p>
+        </p:txBody>
+      </p:sp>
+      <p:sp>
+        <p:nvSpPr>
+          <p:cNvPr id="11" name="직사각형 10">
+            <a:extLst>
+              <a:ext uri="{FF2B5EF4-FFF2-40B4-BE49-F238E27FC236}">
+                <a16:creationId xmlns:a16="http://schemas.microsoft.com/office/drawing/2014/main" id="{D001699E-F746-438F-A03E-2076D3EB7EC2}"/>
+              </a:ext>
+            </a:extLst>
+          </p:cNvPr>
+          <p:cNvSpPr/>
+          <p:nvPr/>
+        </p:nvSpPr>
+        <p:spPr>
+          <a:xfrm>
+            <a:off x="3239147" y="3347633"/>
+            <a:ext cx="7845288" cy="371960"/>
+          </a:xfrm>
+          <a:prstGeom prst="rect">
+            <a:avLst/>
+          </a:prstGeom>
+          <a:noFill/>
+          <a:ln w="28575" cap="flat" cmpd="sng" algn="ctr">
+            <a:solidFill>
+              <a:schemeClr val="accent2"/>
+            </a:solidFill>
+            <a:prstDash val="solid"/>
+            <a:round/>
+            <a:headEnd type="none" w="med" len="med"/>
+            <a:tailEnd type="none" w="med" len="med"/>
+          </a:ln>
+        </p:spPr>
+        <p:style>
+          <a:lnRef idx="0">
+            <a:scrgbClr r="0" g="0" b="0"/>
+          </a:lnRef>
+          <a:fillRef idx="0">
+            <a:scrgbClr r="0" g="0" b="0"/>
+          </a:fillRef>
+          <a:effectRef idx="0">
+            <a:scrgbClr r="0" g="0" b="0"/>
+          </a:effectRef>
+          <a:fontRef idx="minor">
+            <a:schemeClr val="accent2"/>
+          </a:fontRef>
+        </p:style>
+        <p:txBody>
+          <a:bodyPr rtlCol="0" anchor="ctr"/>
+          <a:lstStyle/>
+          <a:p>
+            <a:pPr algn="ctr"/>
+            <a:endParaRPr lang="ko-KR" altLang="en-US"/>
+          </a:p>
+        </p:txBody>
+      </p:sp>
+      <p:pic>
+        <p:nvPicPr>
+          <p:cNvPr id="13" name="그림 12">
+            <a:extLst>
+              <a:ext uri="{FF2B5EF4-FFF2-40B4-BE49-F238E27FC236}">
+                <a16:creationId xmlns:a16="http://schemas.microsoft.com/office/drawing/2014/main" id="{78CF9C24-BB2C-407E-B0FA-06907D7B81E8}"/>
+              </a:ext>
+            </a:extLst>
+          </p:cNvPr>
+          <p:cNvPicPr>
+            <a:picLocks noChangeAspect="1"/>
+          </p:cNvPicPr>
+          <p:nvPr/>
+        </p:nvPicPr>
+        <p:blipFill rotWithShape="1">
+          <a:blip r:embed="rId3"/>
+          <a:srcRect l="2279" t="37963" r="3179"/>
+          <a:stretch/>
+        </p:blipFill>
+        <p:spPr>
+          <a:xfrm>
+            <a:off x="6819254" y="3805586"/>
+            <a:ext cx="3929446" cy="3052414"/>
+          </a:xfrm>
+          <a:prstGeom prst="rect">
+            <a:avLst/>
+          </a:prstGeom>
+        </p:spPr>
+      </p:pic>
+      <p:sp>
+        <p:nvSpPr>
+          <p:cNvPr id="15" name="직사각형 14">
+            <a:extLst>
+              <a:ext uri="{FF2B5EF4-FFF2-40B4-BE49-F238E27FC236}">
+                <a16:creationId xmlns:a16="http://schemas.microsoft.com/office/drawing/2014/main" id="{1B9904FE-7DF3-435A-98E7-7E1A1FDE80BD}"/>
+              </a:ext>
+            </a:extLst>
+          </p:cNvPr>
+          <p:cNvSpPr/>
+          <p:nvPr/>
+        </p:nvSpPr>
+        <p:spPr>
+          <a:xfrm>
+            <a:off x="6878972" y="4064428"/>
+            <a:ext cx="914400" cy="2793571"/>
+          </a:xfrm>
+          <a:prstGeom prst="rect">
+            <a:avLst/>
+          </a:prstGeom>
+          <a:noFill/>
+          <a:ln w="28575" cap="flat" cmpd="sng" algn="ctr">
+            <a:solidFill>
+              <a:srgbClr val="FF0000"/>
+            </a:solidFill>
+            <a:prstDash val="solid"/>
+            <a:round/>
+            <a:headEnd type="none" w="med" len="med"/>
+            <a:tailEnd type="none" w="med" len="med"/>
+          </a:ln>
+        </p:spPr>
+        <p:style>
+          <a:lnRef idx="0">
+            <a:scrgbClr r="0" g="0" b="0"/>
+          </a:lnRef>
+          <a:fillRef idx="0">
+            <a:scrgbClr r="0" g="0" b="0"/>
+          </a:fillRef>
+          <a:effectRef idx="0">
+            <a:scrgbClr r="0" g="0" b="0"/>
+          </a:effectRef>
+          <a:fontRef idx="minor">
+            <a:schemeClr val="accent2"/>
+          </a:fontRef>
+        </p:style>
+        <p:txBody>
+          <a:bodyPr rtlCol="0" anchor="ctr"/>
+          <a:lstStyle/>
+          <a:p>
+            <a:pPr algn="ctr"/>
+            <a:endParaRPr lang="ko-KR" altLang="en-US"/>
+          </a:p>
+        </p:txBody>
+      </p:sp>
+      <p:sp>
+        <p:nvSpPr>
+          <p:cNvPr id="17" name="직사각형 16">
+            <a:extLst>
+              <a:ext uri="{FF2B5EF4-FFF2-40B4-BE49-F238E27FC236}">
+                <a16:creationId xmlns:a16="http://schemas.microsoft.com/office/drawing/2014/main" id="{2682FC04-A9D8-4356-88DE-71B2CC2B414B}"/>
+              </a:ext>
+            </a:extLst>
+          </p:cNvPr>
+          <p:cNvSpPr/>
+          <p:nvPr/>
+        </p:nvSpPr>
+        <p:spPr>
+          <a:xfrm>
+            <a:off x="9932565" y="4064427"/>
+            <a:ext cx="360727" cy="2793571"/>
+          </a:xfrm>
+          <a:prstGeom prst="rect">
+            <a:avLst/>
+          </a:prstGeom>
+          <a:noFill/>
+          <a:ln w="28575" cap="flat" cmpd="sng" algn="ctr">
+            <a:solidFill>
+              <a:srgbClr val="FF0000"/>
+            </a:solidFill>
+            <a:prstDash val="solid"/>
+            <a:round/>
+            <a:headEnd type="none" w="med" len="med"/>
+            <a:tailEnd type="none" w="med" len="med"/>
+          </a:ln>
+        </p:spPr>
+        <p:style>
+          <a:lnRef idx="0">
+            <a:scrgbClr r="0" g="0" b="0"/>
+          </a:lnRef>
+          <a:fillRef idx="0">
+            <a:scrgbClr r="0" g="0" b="0"/>
+          </a:fillRef>
+          <a:effectRef idx="0">
+            <a:scrgbClr r="0" g="0" b="0"/>
+          </a:effectRef>
+          <a:fontRef idx="minor">
+            <a:schemeClr val="accent2"/>
+          </a:fontRef>
+        </p:style>
+        <p:txBody>
+          <a:bodyPr rtlCol="0" anchor="ctr"/>
+          <a:lstStyle/>
+          <a:p>
+            <a:pPr algn="ctr"/>
+            <a:endParaRPr lang="ko-KR" altLang="en-US"/>
+          </a:p>
+        </p:txBody>
+      </p:sp>
+      <p:sp>
+        <p:nvSpPr>
+          <p:cNvPr id="34" name="TextBox 33">
+            <a:extLst>
+              <a:ext uri="{FF2B5EF4-FFF2-40B4-BE49-F238E27FC236}">
+                <a16:creationId xmlns:a16="http://schemas.microsoft.com/office/drawing/2014/main" id="{A1B920C6-293B-498B-9C7E-ED810AAA7BC2}"/>
+              </a:ext>
+            </a:extLst>
+          </p:cNvPr>
+          <p:cNvSpPr txBox="1"/>
+          <p:nvPr/>
+        </p:nvSpPr>
+        <p:spPr>
+          <a:xfrm>
+            <a:off x="2941606" y="4748168"/>
+            <a:ext cx="2469117" cy="369332"/>
+          </a:xfrm>
+          <a:prstGeom prst="rect">
+            <a:avLst/>
+          </a:prstGeom>
+          <a:noFill/>
+        </p:spPr>
+        <p:txBody>
+          <a:bodyPr wrap="square" rtlCol="0">
+            <a:spAutoFit/>
+          </a:bodyPr>
+          <a:lstStyle/>
+          <a:p>
             <a:r>
               <a:rPr lang="ko-KR" altLang="en-US" dirty="0"/>
-              <a:t>을 이용해 </a:t>
+              <a:t>저장 후 </a:t>
             </a:r>
             <a:r>
               <a:rPr lang="ko-KR" altLang="en-US" dirty="0" err="1"/>
-              <a:t>전처리</a:t>
-            </a:r>
-            <a:r>
-              <a:rPr lang="en-US" altLang="ko-KR" dirty="0"/>
-              <a:t>, </a:t>
+              <a:t>태그명</a:t>
             </a:r>
             <a:r>
               <a:rPr lang="ko-KR" altLang="en-US" dirty="0"/>
-              <a:t>시각화 과정</a:t>
-            </a:r>
+              <a:t> 클릭 </a:t>
+            </a:r>
+          </a:p>
+        </p:txBody>
+      </p:sp>
+      <p:sp>
+        <p:nvSpPr>
+          <p:cNvPr id="36" name="직사각형 35">
+            <a:extLst>
+              <a:ext uri="{FF2B5EF4-FFF2-40B4-BE49-F238E27FC236}">
+                <a16:creationId xmlns:a16="http://schemas.microsoft.com/office/drawing/2014/main" id="{62D98E4A-A984-4990-AAC4-0384130C602D}"/>
+              </a:ext>
+            </a:extLst>
+          </p:cNvPr>
+          <p:cNvSpPr/>
+          <p:nvPr/>
+        </p:nvSpPr>
+        <p:spPr>
+          <a:xfrm>
+            <a:off x="488306" y="2550254"/>
+            <a:ext cx="1021712" cy="184558"/>
+          </a:xfrm>
+          <a:prstGeom prst="rect">
+            <a:avLst/>
+          </a:prstGeom>
+          <a:noFill/>
+          <a:ln w="28575" cap="flat" cmpd="sng" algn="ctr">
+            <a:solidFill>
+              <a:srgbClr val="FF0000"/>
+            </a:solidFill>
+            <a:prstDash val="solid"/>
+            <a:round/>
+            <a:headEnd type="none" w="med" len="med"/>
+            <a:tailEnd type="none" w="med" len="med"/>
+          </a:ln>
+        </p:spPr>
+        <p:style>
+          <a:lnRef idx="0">
+            <a:scrgbClr r="0" g="0" b="0"/>
+          </a:lnRef>
+          <a:fillRef idx="0">
+            <a:scrgbClr r="0" g="0" b="0"/>
+          </a:fillRef>
+          <a:effectRef idx="0">
+            <a:scrgbClr r="0" g="0" b="0"/>
+          </a:effectRef>
+          <a:fontRef idx="minor">
+            <a:schemeClr val="accent2"/>
+          </a:fontRef>
+        </p:style>
+        <p:txBody>
+          <a:bodyPr rtlCol="0" anchor="ctr"/>
+          <a:lstStyle/>
+          <a:p>
+            <a:pPr algn="ctr"/>
+            <a:endParaRPr lang="ko-KR" altLang="en-US"/>
+          </a:p>
+        </p:txBody>
+      </p:sp>
+      <p:sp>
+        <p:nvSpPr>
+          <p:cNvPr id="38" name="직사각형 37">
+            <a:extLst>
+              <a:ext uri="{FF2B5EF4-FFF2-40B4-BE49-F238E27FC236}">
+                <a16:creationId xmlns:a16="http://schemas.microsoft.com/office/drawing/2014/main" id="{3B9879FD-0D14-4B9E-AD45-77BA005A1843}"/>
+              </a:ext>
+            </a:extLst>
+          </p:cNvPr>
+          <p:cNvSpPr/>
+          <p:nvPr/>
+        </p:nvSpPr>
+        <p:spPr>
+          <a:xfrm>
+            <a:off x="488306" y="3713307"/>
+            <a:ext cx="1122380" cy="154018"/>
+          </a:xfrm>
+          <a:prstGeom prst="rect">
+            <a:avLst/>
+          </a:prstGeom>
+          <a:noFill/>
+          <a:ln w="28575" cap="flat" cmpd="sng" algn="ctr">
+            <a:solidFill>
+              <a:srgbClr val="FF0000"/>
+            </a:solidFill>
+            <a:prstDash val="solid"/>
+            <a:round/>
+            <a:headEnd type="none" w="med" len="med"/>
+            <a:tailEnd type="none" w="med" len="med"/>
+          </a:ln>
+        </p:spPr>
+        <p:style>
+          <a:lnRef idx="0">
+            <a:scrgbClr r="0" g="0" b="0"/>
+          </a:lnRef>
+          <a:fillRef idx="0">
+            <a:scrgbClr r="0" g="0" b="0"/>
+          </a:fillRef>
+          <a:effectRef idx="0">
+            <a:scrgbClr r="0" g="0" b="0"/>
+          </a:effectRef>
+          <a:fontRef idx="minor">
+            <a:schemeClr val="accent2"/>
+          </a:fontRef>
+        </p:style>
+        <p:txBody>
+          <a:bodyPr rtlCol="0" anchor="ctr"/>
+          <a:lstStyle/>
+          <a:p>
+            <a:pPr algn="ctr"/>
+            <a:endParaRPr lang="ko-KR" altLang="en-US"/>
+          </a:p>
+        </p:txBody>
+      </p:sp>
+      <p:sp>
+        <p:nvSpPr>
+          <p:cNvPr id="40" name="직사각형 39">
+            <a:extLst>
+              <a:ext uri="{FF2B5EF4-FFF2-40B4-BE49-F238E27FC236}">
+                <a16:creationId xmlns:a16="http://schemas.microsoft.com/office/drawing/2014/main" id="{746A4C18-ED76-4489-9E67-3266BBD13E71}"/>
+              </a:ext>
+            </a:extLst>
+          </p:cNvPr>
+          <p:cNvSpPr/>
+          <p:nvPr/>
+        </p:nvSpPr>
+        <p:spPr>
+          <a:xfrm>
+            <a:off x="488306" y="4521665"/>
+            <a:ext cx="4679312" cy="226503"/>
+          </a:xfrm>
+          <a:prstGeom prst="rect">
+            <a:avLst/>
+          </a:prstGeom>
+          <a:noFill/>
+          <a:ln w="28575" cap="flat" cmpd="sng" algn="ctr">
+            <a:solidFill>
+              <a:schemeClr val="accent2"/>
+            </a:solidFill>
+            <a:prstDash val="solid"/>
+            <a:round/>
+            <a:headEnd type="none" w="med" len="med"/>
+            <a:tailEnd type="none" w="med" len="med"/>
+          </a:ln>
+        </p:spPr>
+        <p:style>
+          <a:lnRef idx="0">
+            <a:scrgbClr r="0" g="0" b="0"/>
+          </a:lnRef>
+          <a:fillRef idx="0">
+            <a:scrgbClr r="0" g="0" b="0"/>
+          </a:fillRef>
+          <a:effectRef idx="0">
+            <a:scrgbClr r="0" g="0" b="0"/>
+          </a:effectRef>
+          <a:fontRef idx="minor">
+            <a:schemeClr val="accent2"/>
+          </a:fontRef>
+        </p:style>
+        <p:txBody>
+          <a:bodyPr rtlCol="0" anchor="ctr"/>
+          <a:lstStyle/>
+          <a:p>
+            <a:pPr algn="ctr"/>
+            <a:endParaRPr lang="ko-KR" altLang="en-US"/>
           </a:p>
         </p:txBody>
       </p:sp>
     </p:spTree>
     <p:extLst>
       <p:ext uri="{BB962C8B-B14F-4D97-AF65-F5344CB8AC3E}">
-        <p14:creationId xmlns:p14="http://schemas.microsoft.com/office/powerpoint/2010/main" val="2946530736"/>
+        <p14:creationId xmlns:p14="http://schemas.microsoft.com/office/powerpoint/2010/main" val="1023394710"/>
       </p:ext>
     </p:extLst>
   </p:cSld>
@@ -5405,47 +6348,12 @@
           <a:chExt cx="0" cy="0"/>
         </a:xfrm>
       </p:grpSpPr>
-      <p:sp>
-        <p:nvSpPr>
-          <p:cNvPr id="2" name="TextBox 1">
-            <a:extLst>
-              <a:ext uri="{FF2B5EF4-FFF2-40B4-BE49-F238E27FC236}">
-                <a16:creationId xmlns:a16="http://schemas.microsoft.com/office/drawing/2014/main" id="{BC1C2F49-ADD0-44F2-B739-4AC4205D5D85}"/>
-              </a:ext>
-            </a:extLst>
-          </p:cNvPr>
-          <p:cNvSpPr txBox="1"/>
-          <p:nvPr/>
-        </p:nvSpPr>
-        <p:spPr>
-          <a:xfrm>
-            <a:off x="1940560" y="914400"/>
-            <a:ext cx="6888480" cy="369332"/>
-          </a:xfrm>
-          <a:prstGeom prst="rect">
-            <a:avLst/>
-          </a:prstGeom>
-          <a:noFill/>
-        </p:spPr>
-        <p:txBody>
-          <a:bodyPr wrap="square" rtlCol="0">
-            <a:spAutoFit/>
-          </a:bodyPr>
-          <a:lstStyle/>
-          <a:p>
-            <a:r>
-              <a:rPr lang="ko-KR" altLang="en-US" dirty="0"/>
-              <a:t>알고리즘 별 그래프</a:t>
-            </a:r>
-          </a:p>
-        </p:txBody>
-      </p:sp>
       <p:pic>
         <p:nvPicPr>
-          <p:cNvPr id="22" name="그림 21">
-            <a:extLst>
-              <a:ext uri="{FF2B5EF4-FFF2-40B4-BE49-F238E27FC236}">
-                <a16:creationId xmlns:a16="http://schemas.microsoft.com/office/drawing/2014/main" id="{D8E8D0AD-50FD-4EAD-A40F-F463CBA61680}"/>
+          <p:cNvPr id="13" name="그림 12">
+            <a:extLst>
+              <a:ext uri="{FF2B5EF4-FFF2-40B4-BE49-F238E27FC236}">
+                <a16:creationId xmlns:a16="http://schemas.microsoft.com/office/drawing/2014/main" id="{96CE4F0C-86BF-464C-8C8D-DED2EFCFF756}"/>
               </a:ext>
             </a:extLst>
           </p:cNvPr>
@@ -5455,33 +6363,67 @@
           <p:nvPr/>
         </p:nvPicPr>
         <p:blipFill>
-          <a:blip r:embed="rId2">
-            <a:extLst>
-              <a:ext uri="{28A0092B-C50C-407E-A947-70E740481C1C}">
-                <a14:useLocalDpi xmlns:a14="http://schemas.microsoft.com/office/drawing/2010/main" val="0"/>
-              </a:ext>
-            </a:extLst>
-          </a:blip>
+          <a:blip r:embed="rId2"/>
           <a:stretch>
             <a:fillRect/>
           </a:stretch>
         </p:blipFill>
         <p:spPr>
-          <a:xfrm rot="10800000" flipH="1" flipV="1">
-            <a:off x="6312160" y="2170954"/>
-            <a:ext cx="2358577" cy="1315975"/>
+          <a:xfrm>
+            <a:off x="56888" y="1013758"/>
+            <a:ext cx="10534650" cy="4629150"/>
           </a:xfrm>
           <a:prstGeom prst="rect">
             <a:avLst/>
           </a:prstGeom>
         </p:spPr>
       </p:pic>
+      <p:sp>
+        <p:nvSpPr>
+          <p:cNvPr id="4" name="TextBox 3">
+            <a:extLst>
+              <a:ext uri="{FF2B5EF4-FFF2-40B4-BE49-F238E27FC236}">
+                <a16:creationId xmlns:a16="http://schemas.microsoft.com/office/drawing/2014/main" id="{95B1C396-6081-4CBE-890E-0039011BC112}"/>
+              </a:ext>
+            </a:extLst>
+          </p:cNvPr>
+          <p:cNvSpPr txBox="1"/>
+          <p:nvPr/>
+        </p:nvSpPr>
+        <p:spPr>
+          <a:xfrm>
+            <a:off x="0" y="0"/>
+            <a:ext cx="2243983" cy="523220"/>
+          </a:xfrm>
+          <a:prstGeom prst="rect">
+            <a:avLst/>
+          </a:prstGeom>
+          <a:noFill/>
+        </p:spPr>
+        <p:txBody>
+          <a:bodyPr wrap="square" rtlCol="0">
+            <a:spAutoFit/>
+          </a:bodyPr>
+          <a:lstStyle/>
+          <a:p>
+            <a:pPr algn="ctr"/>
+            <a:r>
+              <a:rPr lang="ko-KR" altLang="en-US" sz="2800" dirty="0" err="1"/>
+              <a:t>크롤링</a:t>
+            </a:r>
+            <a:r>
+              <a:rPr lang="ko-KR" altLang="en-US" sz="2800" dirty="0"/>
+              <a:t> 과정</a:t>
+            </a:r>
+          </a:p>
+        </p:txBody>
+      </p:sp>
       <p:pic>
         <p:nvPicPr>
-          <p:cNvPr id="30" name="그림 29">
-            <a:extLst>
-              <a:ext uri="{FF2B5EF4-FFF2-40B4-BE49-F238E27FC236}">
-                <a16:creationId xmlns:a16="http://schemas.microsoft.com/office/drawing/2014/main" id="{72CCF24A-7894-437B-8E52-83506EA572DF}"/>
+          <p:cNvPr id="2" name="그림 1">
+            <a:extLst>
+              <a:ext uri="{FF2B5EF4-FFF2-40B4-BE49-F238E27FC236}">
+                <a16:creationId xmlns:a16="http://schemas.microsoft.com/office/drawing/2014/main" id="{34F9AA84-DEA8-4D30-AE82-799BBEDE5675}"/>
               </a:ext>
             </a:extLst>
           </p:cNvPr>
@@ -5491,33 +6433,189 @@
           <p:nvPr/>
         </p:nvPicPr>
         <p:blipFill>
-          <a:blip r:embed="rId3">
-            <a:extLst>
-              <a:ext uri="{28A0092B-C50C-407E-A947-70E740481C1C}">
-                <a14:useLocalDpi xmlns:a14="http://schemas.microsoft.com/office/drawing/2010/main" val="0"/>
-              </a:ext>
-            </a:extLst>
-          </a:blip>
+          <a:blip r:embed="rId3"/>
           <a:stretch>
             <a:fillRect/>
           </a:stretch>
         </p:blipFill>
         <p:spPr>
-          <a:xfrm rot="10800000" flipH="1" flipV="1">
-            <a:off x="8562197" y="2166922"/>
-            <a:ext cx="2358577" cy="1315975"/>
+          <a:xfrm>
+            <a:off x="6877231" y="0"/>
+            <a:ext cx="5018357" cy="2843868"/>
           </a:xfrm>
           <a:prstGeom prst="rect">
             <a:avLst/>
           </a:prstGeom>
         </p:spPr>
       </p:pic>
+      <p:sp>
+        <p:nvSpPr>
+          <p:cNvPr id="6" name="직사각형 5">
+            <a:extLst>
+              <a:ext uri="{FF2B5EF4-FFF2-40B4-BE49-F238E27FC236}">
+                <a16:creationId xmlns:a16="http://schemas.microsoft.com/office/drawing/2014/main" id="{97DA8146-CB32-401D-A109-27A3C8E07DCF}"/>
+              </a:ext>
+            </a:extLst>
+          </p:cNvPr>
+          <p:cNvSpPr/>
+          <p:nvPr/>
+        </p:nvSpPr>
+        <p:spPr>
+          <a:xfrm>
+            <a:off x="11442881" y="261610"/>
+            <a:ext cx="326873" cy="2582258"/>
+          </a:xfrm>
+          <a:prstGeom prst="rect">
+            <a:avLst/>
+          </a:prstGeom>
+          <a:noFill/>
+          <a:ln w="28575" cap="flat" cmpd="sng" algn="ctr">
+            <a:solidFill>
+              <a:srgbClr val="FF0000"/>
+            </a:solidFill>
+            <a:prstDash val="solid"/>
+            <a:round/>
+            <a:headEnd type="none" w="med" len="med"/>
+            <a:tailEnd type="none" w="med" len="med"/>
+          </a:ln>
+        </p:spPr>
+        <p:style>
+          <a:lnRef idx="0">
+            <a:scrgbClr r="0" g="0" b="0"/>
+          </a:lnRef>
+          <a:fillRef idx="0">
+            <a:scrgbClr r="0" g="0" b="0"/>
+          </a:fillRef>
+          <a:effectRef idx="0">
+            <a:scrgbClr r="0" g="0" b="0"/>
+          </a:effectRef>
+          <a:fontRef idx="minor">
+            <a:schemeClr val="accent2"/>
+          </a:fontRef>
+        </p:style>
+        <p:txBody>
+          <a:bodyPr rtlCol="0" anchor="ctr"/>
+          <a:lstStyle/>
+          <a:p>
+            <a:pPr algn="ctr"/>
+            <a:endParaRPr lang="ko-KR" altLang="en-US"/>
+          </a:p>
+        </p:txBody>
+      </p:sp>
+      <p:sp>
+        <p:nvSpPr>
+          <p:cNvPr id="8" name="직사각형 7">
+            <a:extLst>
+              <a:ext uri="{FF2B5EF4-FFF2-40B4-BE49-F238E27FC236}">
+                <a16:creationId xmlns:a16="http://schemas.microsoft.com/office/drawing/2014/main" id="{6F9241A1-A390-4B45-9530-035EA94CD694}"/>
+              </a:ext>
+            </a:extLst>
+          </p:cNvPr>
+          <p:cNvSpPr/>
+          <p:nvPr/>
+        </p:nvSpPr>
+        <p:spPr>
+          <a:xfrm>
+            <a:off x="1494236" y="1300294"/>
+            <a:ext cx="5342792" cy="322052"/>
+          </a:xfrm>
+          <a:prstGeom prst="rect">
+            <a:avLst/>
+          </a:prstGeom>
+          <a:noFill/>
+          <a:ln w="28575" cap="flat" cmpd="sng" algn="ctr">
+            <a:solidFill>
+              <a:schemeClr val="accent2"/>
+            </a:solidFill>
+            <a:prstDash val="solid"/>
+            <a:round/>
+            <a:headEnd type="none" w="med" len="med"/>
+            <a:tailEnd type="none" w="med" len="med"/>
+          </a:ln>
+        </p:spPr>
+        <p:style>
+          <a:lnRef idx="0">
+            <a:scrgbClr r="0" g="0" b="0"/>
+          </a:lnRef>
+          <a:fillRef idx="0">
+            <a:scrgbClr r="0" g="0" b="0"/>
+          </a:fillRef>
+          <a:effectRef idx="0">
+            <a:scrgbClr r="0" g="0" b="0"/>
+          </a:effectRef>
+          <a:fontRef idx="minor">
+            <a:schemeClr val="accent2"/>
+          </a:fontRef>
+        </p:style>
+        <p:txBody>
+          <a:bodyPr rtlCol="0" anchor="ctr"/>
+          <a:lstStyle/>
+          <a:p>
+            <a:pPr algn="ctr"/>
+            <a:endParaRPr lang="ko-KR" altLang="en-US"/>
+          </a:p>
+        </p:txBody>
+      </p:sp>
+      <p:sp>
+        <p:nvSpPr>
+          <p:cNvPr id="10" name="직사각형 9">
+            <a:extLst>
+              <a:ext uri="{FF2B5EF4-FFF2-40B4-BE49-F238E27FC236}">
+                <a16:creationId xmlns:a16="http://schemas.microsoft.com/office/drawing/2014/main" id="{4D5C63D9-EDCA-4862-9525-18C57A85AB5A}"/>
+              </a:ext>
+            </a:extLst>
+          </p:cNvPr>
+          <p:cNvSpPr/>
+          <p:nvPr/>
+        </p:nvSpPr>
+        <p:spPr>
+          <a:xfrm>
+            <a:off x="255418" y="1622346"/>
+            <a:ext cx="1170709" cy="156120"/>
+          </a:xfrm>
+          <a:prstGeom prst="rect">
+            <a:avLst/>
+          </a:prstGeom>
+          <a:noFill/>
+          <a:ln w="28575" cap="flat" cmpd="sng" algn="ctr">
+            <a:solidFill>
+              <a:srgbClr val="FF0000"/>
+            </a:solidFill>
+            <a:prstDash val="solid"/>
+            <a:round/>
+            <a:headEnd type="none" w="med" len="med"/>
+            <a:tailEnd type="none" w="med" len="med"/>
+          </a:ln>
+        </p:spPr>
+        <p:style>
+          <a:lnRef idx="0">
+            <a:scrgbClr r="0" g="0" b="0"/>
+          </a:lnRef>
+          <a:fillRef idx="0">
+            <a:scrgbClr r="0" g="0" b="0"/>
+          </a:fillRef>
+          <a:effectRef idx="0">
+            <a:scrgbClr r="0" g="0" b="0"/>
+          </a:effectRef>
+          <a:fontRef idx="minor">
+            <a:schemeClr val="accent2"/>
+          </a:fontRef>
+        </p:style>
+        <p:txBody>
+          <a:bodyPr rtlCol="0" anchor="ctr"/>
+          <a:lstStyle/>
+          <a:p>
+            <a:pPr algn="ctr"/>
+            <a:endParaRPr lang="ko-KR" altLang="en-US"/>
+          </a:p>
+        </p:txBody>
+      </p:sp>
       <p:pic>
         <p:nvPicPr>
-          <p:cNvPr id="54" name="그림 53">
-            <a:extLst>
-              <a:ext uri="{FF2B5EF4-FFF2-40B4-BE49-F238E27FC236}">
-                <a16:creationId xmlns:a16="http://schemas.microsoft.com/office/drawing/2014/main" id="{E5A4A48B-3521-4FFA-AEFD-67D2C53CE451}"/>
+          <p:cNvPr id="12" name="그림 11">
+            <a:extLst>
+              <a:ext uri="{FF2B5EF4-FFF2-40B4-BE49-F238E27FC236}">
+                <a16:creationId xmlns:a16="http://schemas.microsoft.com/office/drawing/2014/main" id="{E84C7AF7-0A61-495A-AE69-9324EC9BEB66}"/>
               </a:ext>
             </a:extLst>
           </p:cNvPr>
@@ -5526,68 +6624,405 @@
           </p:cNvPicPr>
           <p:nvPr/>
         </p:nvPicPr>
-        <p:blipFill>
-          <a:blip r:embed="rId4">
-            <a:extLst>
-              <a:ext uri="{28A0092B-C50C-407E-A947-70E740481C1C}">
-                <a14:useLocalDpi xmlns:a14="http://schemas.microsoft.com/office/drawing/2010/main" val="0"/>
-              </a:ext>
-            </a:extLst>
-          </a:blip>
-          <a:stretch>
-            <a:fillRect/>
-          </a:stretch>
+        <p:blipFill rotWithShape="1">
+          <a:blip r:embed="rId4"/>
+          <a:srcRect t="28435" b="27981"/>
+          <a:stretch/>
         </p:blipFill>
         <p:spPr>
-          <a:xfrm rot="10800000" flipH="1" flipV="1">
-            <a:off x="8596208" y="3429000"/>
-            <a:ext cx="2358577" cy="1315975"/>
+          <a:xfrm>
+            <a:off x="4449960" y="3280191"/>
+            <a:ext cx="6553200" cy="402672"/>
           </a:xfrm>
           <a:prstGeom prst="rect">
             <a:avLst/>
           </a:prstGeom>
         </p:spPr>
       </p:pic>
-      <p:pic>
-        <p:nvPicPr>
-          <p:cNvPr id="58" name="그림 57">
-            <a:extLst>
-              <a:ext uri="{FF2B5EF4-FFF2-40B4-BE49-F238E27FC236}">
-                <a16:creationId xmlns:a16="http://schemas.microsoft.com/office/drawing/2014/main" id="{14B38EF1-3F0E-4CCA-93B8-F2A33A012284}"/>
-              </a:ext>
-            </a:extLst>
-          </p:cNvPr>
-          <p:cNvPicPr>
-            <a:picLocks noChangeAspect="1"/>
-          </p:cNvPicPr>
+      <p:sp>
+        <p:nvSpPr>
+          <p:cNvPr id="14" name="직사각형 13">
+            <a:extLst>
+              <a:ext uri="{FF2B5EF4-FFF2-40B4-BE49-F238E27FC236}">
+                <a16:creationId xmlns:a16="http://schemas.microsoft.com/office/drawing/2014/main" id="{01663661-12B1-43F5-89CD-866CF95A63AD}"/>
+              </a:ext>
+            </a:extLst>
+          </p:cNvPr>
+          <p:cNvSpPr/>
           <p:nvPr/>
-        </p:nvPicPr>
-        <p:blipFill>
-          <a:blip r:embed="rId5">
-            <a:extLst>
-              <a:ext uri="{28A0092B-C50C-407E-A947-70E740481C1C}">
-                <a14:useLocalDpi xmlns:a14="http://schemas.microsoft.com/office/drawing/2010/main" val="0"/>
-              </a:ext>
-            </a:extLst>
-          </a:blip>
-          <a:stretch>
-            <a:fillRect/>
-          </a:stretch>
-        </p:blipFill>
-        <p:spPr>
-          <a:xfrm rot="10800000" flipH="1" flipV="1">
-            <a:off x="6312160" y="3429000"/>
-            <a:ext cx="2358577" cy="1315975"/>
+        </p:nvSpPr>
+        <p:spPr>
+          <a:xfrm>
+            <a:off x="202290" y="2016723"/>
+            <a:ext cx="4789160" cy="667660"/>
           </a:xfrm>
           <a:prstGeom prst="rect">
             <a:avLst/>
           </a:prstGeom>
-        </p:spPr>
-      </p:pic>
+          <a:noFill/>
+          <a:ln w="28575" cap="flat" cmpd="sng" algn="ctr">
+            <a:solidFill>
+              <a:schemeClr val="accent2"/>
+            </a:solidFill>
+            <a:prstDash val="solid"/>
+            <a:round/>
+            <a:headEnd type="none" w="med" len="med"/>
+            <a:tailEnd type="none" w="med" len="med"/>
+          </a:ln>
+        </p:spPr>
+        <p:style>
+          <a:lnRef idx="0">
+            <a:scrgbClr r="0" g="0" b="0"/>
+          </a:lnRef>
+          <a:fillRef idx="0">
+            <a:scrgbClr r="0" g="0" b="0"/>
+          </a:fillRef>
+          <a:effectRef idx="0">
+            <a:scrgbClr r="0" g="0" b="0"/>
+          </a:effectRef>
+          <a:fontRef idx="minor">
+            <a:schemeClr val="accent2"/>
+          </a:fontRef>
+        </p:style>
+        <p:txBody>
+          <a:bodyPr rtlCol="0" anchor="ctr"/>
+          <a:lstStyle/>
+          <a:p>
+            <a:pPr algn="ctr"/>
+            <a:endParaRPr lang="ko-KR" altLang="en-US"/>
+          </a:p>
+        </p:txBody>
+      </p:sp>
+      <p:sp>
+        <p:nvSpPr>
+          <p:cNvPr id="19" name="직사각형 18">
+            <a:extLst>
+              <a:ext uri="{FF2B5EF4-FFF2-40B4-BE49-F238E27FC236}">
+                <a16:creationId xmlns:a16="http://schemas.microsoft.com/office/drawing/2014/main" id="{F67E8D03-3D0A-4C2B-8303-3D6308292713}"/>
+              </a:ext>
+            </a:extLst>
+          </p:cNvPr>
+          <p:cNvSpPr/>
+          <p:nvPr/>
+        </p:nvSpPr>
+        <p:spPr>
+          <a:xfrm>
+            <a:off x="2906295" y="2910980"/>
+            <a:ext cx="7657143" cy="142614"/>
+          </a:xfrm>
+          <a:prstGeom prst="rect">
+            <a:avLst/>
+          </a:prstGeom>
+          <a:noFill/>
+          <a:ln w="28575" cap="flat" cmpd="sng" algn="ctr">
+            <a:solidFill>
+              <a:schemeClr val="accent2"/>
+            </a:solidFill>
+            <a:prstDash val="solid"/>
+            <a:round/>
+            <a:headEnd type="none" w="med" len="med"/>
+            <a:tailEnd type="none" w="med" len="med"/>
+          </a:ln>
+        </p:spPr>
+        <p:style>
+          <a:lnRef idx="0">
+            <a:scrgbClr r="0" g="0" b="0"/>
+          </a:lnRef>
+          <a:fillRef idx="0">
+            <a:scrgbClr r="0" g="0" b="0"/>
+          </a:fillRef>
+          <a:effectRef idx="0">
+            <a:scrgbClr r="0" g="0" b="0"/>
+          </a:effectRef>
+          <a:fontRef idx="minor">
+            <a:schemeClr val="accent2"/>
+          </a:fontRef>
+        </p:style>
+        <p:txBody>
+          <a:bodyPr rtlCol="0" anchor="ctr"/>
+          <a:lstStyle/>
+          <a:p>
+            <a:pPr algn="ctr"/>
+            <a:endParaRPr lang="ko-KR" altLang="en-US"/>
+          </a:p>
+        </p:txBody>
+      </p:sp>
+      <p:cxnSp>
+        <p:nvCxnSpPr>
+          <p:cNvPr id="22" name="직선 화살표 연결선 21">
+            <a:extLst>
+              <a:ext uri="{FF2B5EF4-FFF2-40B4-BE49-F238E27FC236}">
+                <a16:creationId xmlns:a16="http://schemas.microsoft.com/office/drawing/2014/main" id="{7EEB1A44-58C2-4369-9E84-19ECFFA85AAE}"/>
+              </a:ext>
+            </a:extLst>
+          </p:cNvPr>
+          <p:cNvCxnSpPr>
+            <a:cxnSpLocks/>
+          </p:cNvCxnSpPr>
+          <p:nvPr/>
+        </p:nvCxnSpPr>
+        <p:spPr>
+          <a:xfrm>
+            <a:off x="4756558" y="3053594"/>
+            <a:ext cx="0" cy="371626"/>
+          </a:xfrm>
+          <a:prstGeom prst="straightConnector1">
+            <a:avLst/>
+          </a:prstGeom>
+          <a:ln w="28575">
+            <a:solidFill>
+              <a:schemeClr val="accent2"/>
+            </a:solidFill>
+            <a:tailEnd type="triangle"/>
+          </a:ln>
+        </p:spPr>
+        <p:style>
+          <a:lnRef idx="1">
+            <a:schemeClr val="accent1"/>
+          </a:lnRef>
+          <a:fillRef idx="0">
+            <a:schemeClr val="accent1"/>
+          </a:fillRef>
+          <a:effectRef idx="0">
+            <a:schemeClr val="accent1"/>
+          </a:effectRef>
+          <a:fontRef idx="minor">
+            <a:schemeClr val="tx1"/>
+          </a:fontRef>
+        </p:style>
+      </p:cxnSp>
+      <p:cxnSp>
+        <p:nvCxnSpPr>
+          <p:cNvPr id="30" name="직선 화살표 연결선 29">
+            <a:extLst>
+              <a:ext uri="{FF2B5EF4-FFF2-40B4-BE49-F238E27FC236}">
+                <a16:creationId xmlns:a16="http://schemas.microsoft.com/office/drawing/2014/main" id="{3C26ACF6-4C6C-4D35-84F0-5980202FE0CA}"/>
+              </a:ext>
+            </a:extLst>
+          </p:cNvPr>
+          <p:cNvCxnSpPr>
+            <a:cxnSpLocks/>
+          </p:cNvCxnSpPr>
+          <p:nvPr/>
+        </p:nvCxnSpPr>
+        <p:spPr>
+          <a:xfrm>
+            <a:off x="4890782" y="2684383"/>
+            <a:ext cx="100668" cy="740837"/>
+          </a:xfrm>
+          <a:prstGeom prst="straightConnector1">
+            <a:avLst/>
+          </a:prstGeom>
+          <a:ln w="28575">
+            <a:solidFill>
+              <a:schemeClr val="accent2"/>
+            </a:solidFill>
+            <a:tailEnd type="triangle"/>
+          </a:ln>
+        </p:spPr>
+        <p:style>
+          <a:lnRef idx="1">
+            <a:schemeClr val="accent1"/>
+          </a:lnRef>
+          <a:fillRef idx="0">
+            <a:schemeClr val="accent1"/>
+          </a:fillRef>
+          <a:effectRef idx="0">
+            <a:schemeClr val="accent1"/>
+          </a:effectRef>
+          <a:fontRef idx="minor">
+            <a:schemeClr val="tx1"/>
+          </a:fontRef>
+        </p:style>
+      </p:cxnSp>
+      <p:sp>
+        <p:nvSpPr>
+          <p:cNvPr id="27" name="TextBox 26">
+            <a:extLst>
+              <a:ext uri="{FF2B5EF4-FFF2-40B4-BE49-F238E27FC236}">
+                <a16:creationId xmlns:a16="http://schemas.microsoft.com/office/drawing/2014/main" id="{053F2A2E-BC76-443A-9D10-A361F6A06705}"/>
+              </a:ext>
+            </a:extLst>
+          </p:cNvPr>
+          <p:cNvSpPr txBox="1"/>
+          <p:nvPr/>
+        </p:nvSpPr>
+        <p:spPr>
+          <a:xfrm>
+            <a:off x="4979565" y="2093506"/>
+            <a:ext cx="2144089" cy="430887"/>
+          </a:xfrm>
+          <a:prstGeom prst="rect">
+            <a:avLst/>
+          </a:prstGeom>
+          <a:noFill/>
+        </p:spPr>
+        <p:txBody>
+          <a:bodyPr wrap="square" rtlCol="0">
+            <a:spAutoFit/>
+          </a:bodyPr>
+          <a:lstStyle/>
+          <a:p>
+            <a:r>
+              <a:rPr lang="ko-KR" altLang="en-US" sz="1100" dirty="0"/>
+              <a:t>자동으로 다음 페이지의 </a:t>
+            </a:r>
+            <a:endParaRPr lang="en-US" altLang="ko-KR" sz="1100" dirty="0"/>
+          </a:p>
+          <a:p>
+            <a:r>
+              <a:rPr lang="ko-KR" altLang="en-US" sz="1100" dirty="0"/>
+              <a:t>태그명이 </a:t>
+            </a:r>
+            <a:r>
+              <a:rPr lang="en-US" altLang="ko-KR" sz="1100" dirty="0"/>
+              <a:t>#next_page</a:t>
+            </a:r>
+            <a:r>
+              <a:rPr lang="ko-KR" altLang="en-US" sz="1100" dirty="0"/>
+              <a:t>로 변경</a:t>
+            </a:r>
+          </a:p>
+        </p:txBody>
+      </p:sp>
+      <p:sp>
+        <p:nvSpPr>
+          <p:cNvPr id="28" name="TextBox 27">
+            <a:extLst>
+              <a:ext uri="{FF2B5EF4-FFF2-40B4-BE49-F238E27FC236}">
+                <a16:creationId xmlns:a16="http://schemas.microsoft.com/office/drawing/2014/main" id="{D6B3E533-7214-4291-A307-379AB14A3410}"/>
+              </a:ext>
+            </a:extLst>
+          </p:cNvPr>
+          <p:cNvSpPr txBox="1"/>
+          <p:nvPr/>
+        </p:nvSpPr>
+        <p:spPr>
+          <a:xfrm>
+            <a:off x="8276085" y="3053594"/>
+            <a:ext cx="1545875" cy="261610"/>
+          </a:xfrm>
+          <a:prstGeom prst="rect">
+            <a:avLst/>
+          </a:prstGeom>
+          <a:noFill/>
+        </p:spPr>
+        <p:txBody>
+          <a:bodyPr wrap="square" rtlCol="0">
+            <a:spAutoFit/>
+          </a:bodyPr>
+          <a:lstStyle/>
+          <a:p>
+            <a:r>
+              <a:rPr lang="ko-KR" altLang="en-US" sz="1100"/>
+              <a:t>현재 활성화된 페이지</a:t>
+            </a:r>
+            <a:endParaRPr lang="en-US" altLang="ko-KR" sz="1100" dirty="0"/>
+          </a:p>
+        </p:txBody>
+      </p:sp>
+      <p:sp>
+        <p:nvSpPr>
+          <p:cNvPr id="15" name="L 도형 14">
+            <a:extLst>
+              <a:ext uri="{FF2B5EF4-FFF2-40B4-BE49-F238E27FC236}">
+                <a16:creationId xmlns:a16="http://schemas.microsoft.com/office/drawing/2014/main" id="{E6F2C6A8-F3CF-43BC-9BC4-77EB5E3CDF0E}"/>
+              </a:ext>
+            </a:extLst>
+          </p:cNvPr>
+          <p:cNvSpPr/>
+          <p:nvPr/>
+        </p:nvSpPr>
+        <p:spPr>
+          <a:xfrm>
+            <a:off x="202291" y="3315205"/>
+            <a:ext cx="5284109" cy="2036972"/>
+          </a:xfrm>
+          <a:prstGeom prst="corner">
+            <a:avLst>
+              <a:gd name="adj1" fmla="val 70026"/>
+              <a:gd name="adj2" fmla="val 184894"/>
+            </a:avLst>
+          </a:prstGeom>
+          <a:noFill/>
+          <a:ln w="28575">
+            <a:solidFill>
+              <a:schemeClr val="accent2"/>
+            </a:solidFill>
+          </a:ln>
+        </p:spPr>
+        <p:style>
+          <a:lnRef idx="2">
+            <a:schemeClr val="accent1">
+              <a:shade val="50000"/>
+            </a:schemeClr>
+          </a:lnRef>
+          <a:fillRef idx="1">
+            <a:schemeClr val="accent1"/>
+          </a:fillRef>
+          <a:effectRef idx="0">
+            <a:schemeClr val="accent1"/>
+          </a:effectRef>
+          <a:fontRef idx="minor">
+            <a:schemeClr val="lt1"/>
+          </a:fontRef>
+        </p:style>
+        <p:txBody>
+          <a:bodyPr rtlCol="0" anchor="ctr"/>
+          <a:lstStyle/>
+          <a:p>
+            <a:pPr algn="ctr"/>
+            <a:endParaRPr lang="ko-KR" altLang="en-US"/>
+          </a:p>
+        </p:txBody>
+      </p:sp>
+      <p:sp>
+        <p:nvSpPr>
+          <p:cNvPr id="16" name="TextBox 15">
+            <a:extLst>
+              <a:ext uri="{FF2B5EF4-FFF2-40B4-BE49-F238E27FC236}">
+                <a16:creationId xmlns:a16="http://schemas.microsoft.com/office/drawing/2014/main" id="{F6350234-B2F4-41B0-86E5-4245C67124A8}"/>
+              </a:ext>
+            </a:extLst>
+          </p:cNvPr>
+          <p:cNvSpPr txBox="1"/>
+          <p:nvPr/>
+        </p:nvSpPr>
+        <p:spPr>
+          <a:xfrm>
+            <a:off x="3277998" y="4851212"/>
+            <a:ext cx="2038281" cy="430887"/>
+          </a:xfrm>
+          <a:prstGeom prst="rect">
+            <a:avLst/>
+          </a:prstGeom>
+          <a:noFill/>
+        </p:spPr>
+        <p:txBody>
+          <a:bodyPr wrap="square" rtlCol="0">
+            <a:spAutoFit/>
+          </a:bodyPr>
+          <a:lstStyle/>
+          <a:p>
+            <a:r>
+              <a:rPr lang="ko-KR" altLang="en-US" sz="1100" dirty="0"/>
+              <a:t>마지막 페이지 까지 이동 후 각 알고리즘별 </a:t>
+            </a:r>
+            <a:r>
+              <a:rPr lang="en-US" altLang="ko-KR" sz="1100" dirty="0"/>
+              <a:t>csv</a:t>
+            </a:r>
+            <a:r>
+              <a:rPr lang="ko-KR" altLang="en-US" sz="1100" dirty="0"/>
+              <a:t>파일 생성 </a:t>
+            </a:r>
+          </a:p>
+        </p:txBody>
+      </p:sp>
     </p:spTree>
     <p:extLst>
       <p:ext uri="{BB962C8B-B14F-4D97-AF65-F5344CB8AC3E}">
-        <p14:creationId xmlns:p14="http://schemas.microsoft.com/office/powerpoint/2010/main" val="2215500991"/>
+        <p14:creationId xmlns:p14="http://schemas.microsoft.com/office/powerpoint/2010/main" val="1683435143"/>
       </p:ext>
     </p:extLst>
   </p:cSld>
@@ -5616,10 +7051,10 @@
       </p:grpSpPr>
       <p:sp>
         <p:nvSpPr>
-          <p:cNvPr id="2" name="TextBox 1">
-            <a:extLst>
-              <a:ext uri="{FF2B5EF4-FFF2-40B4-BE49-F238E27FC236}">
-                <a16:creationId xmlns:a16="http://schemas.microsoft.com/office/drawing/2014/main" id="{BC1C2F49-ADD0-44F2-B739-4AC4205D5D85}"/>
+          <p:cNvPr id="4" name="TextBox 3">
+            <a:extLst>
+              <a:ext uri="{FF2B5EF4-FFF2-40B4-BE49-F238E27FC236}">
+                <a16:creationId xmlns:a16="http://schemas.microsoft.com/office/drawing/2014/main" id="{95B1C396-6081-4CBE-890E-0039011BC112}"/>
               </a:ext>
             </a:extLst>
           </p:cNvPr>
@@ -5643,166 +7078,36 @@
           <a:lstStyle/>
           <a:p>
             <a:r>
+              <a:rPr lang="en-US" altLang="ko-KR" dirty="0" err="1"/>
+              <a:t>Dplyr</a:t>
+            </a:r>
+            <a:r>
+              <a:rPr lang="en-US" altLang="ko-KR" dirty="0"/>
+              <a:t> </a:t>
+            </a:r>
+            <a:r>
               <a:rPr lang="ko-KR" altLang="en-US" dirty="0"/>
-              <a:t>알고리즘 별 그래프 해설</a:t>
-            </a:r>
-          </a:p>
-        </p:txBody>
-      </p:sp>
-      <p:pic>
-        <p:nvPicPr>
-          <p:cNvPr id="4" name="그림 3">
-            <a:extLst>
-              <a:ext uri="{FF2B5EF4-FFF2-40B4-BE49-F238E27FC236}">
-                <a16:creationId xmlns:a16="http://schemas.microsoft.com/office/drawing/2014/main" id="{91FE9064-4642-4C89-9F33-D221CCA2CBAA}"/>
-              </a:ext>
-            </a:extLst>
-          </p:cNvPr>
-          <p:cNvPicPr>
-            <a:picLocks noChangeAspect="1"/>
-          </p:cNvPicPr>
-          <p:nvPr/>
-        </p:nvPicPr>
-        <p:blipFill>
-          <a:blip r:embed="rId2">
-            <a:extLst>
-              <a:ext uri="{28A0092B-C50C-407E-A947-70E740481C1C}">
-                <a14:useLocalDpi xmlns:a14="http://schemas.microsoft.com/office/drawing/2010/main" val="0"/>
-              </a:ext>
-            </a:extLst>
-          </a:blip>
-          <a:stretch>
-            <a:fillRect/>
-          </a:stretch>
-        </p:blipFill>
-        <p:spPr>
-          <a:xfrm rot="10800000" flipH="1" flipV="1">
-            <a:off x="576115" y="2005469"/>
-            <a:ext cx="5303727" cy="2847060"/>
-          </a:xfrm>
-          <a:prstGeom prst="rect">
-            <a:avLst/>
-          </a:prstGeom>
-        </p:spPr>
-      </p:pic>
-      <p:pic>
-        <p:nvPicPr>
-          <p:cNvPr id="6" name="그림 5">
-            <a:extLst>
-              <a:ext uri="{FF2B5EF4-FFF2-40B4-BE49-F238E27FC236}">
-                <a16:creationId xmlns:a16="http://schemas.microsoft.com/office/drawing/2014/main" id="{E2705A7E-C841-42B2-B154-992D8D47EEAC}"/>
-              </a:ext>
-            </a:extLst>
-          </p:cNvPr>
-          <p:cNvPicPr>
-            <a:picLocks noChangeAspect="1"/>
-          </p:cNvPicPr>
-          <p:nvPr/>
-        </p:nvPicPr>
-        <p:blipFill>
-          <a:blip r:embed="rId3">
-            <a:extLst>
-              <a:ext uri="{28A0092B-C50C-407E-A947-70E740481C1C}">
-                <a14:useLocalDpi xmlns:a14="http://schemas.microsoft.com/office/drawing/2010/main" val="0"/>
-              </a:ext>
-            </a:extLst>
-          </a:blip>
-          <a:stretch>
-            <a:fillRect/>
-          </a:stretch>
-        </p:blipFill>
-        <p:spPr>
-          <a:xfrm>
-            <a:off x="6277694" y="2005469"/>
-            <a:ext cx="5102691" cy="2847061"/>
-          </a:xfrm>
-          <a:prstGeom prst="rect">
-            <a:avLst/>
-          </a:prstGeom>
-        </p:spPr>
-      </p:pic>
-      <p:sp>
-        <p:nvSpPr>
-          <p:cNvPr id="8" name="TextBox 7">
-            <a:extLst>
-              <a:ext uri="{FF2B5EF4-FFF2-40B4-BE49-F238E27FC236}">
-                <a16:creationId xmlns:a16="http://schemas.microsoft.com/office/drawing/2014/main" id="{4A87B64F-B918-4AA4-BBC9-99FD08015CA5}"/>
-              </a:ext>
-            </a:extLst>
-          </p:cNvPr>
-          <p:cNvSpPr txBox="1"/>
-          <p:nvPr/>
-        </p:nvSpPr>
-        <p:spPr>
-          <a:xfrm>
-            <a:off x="1072682" y="5204935"/>
-            <a:ext cx="4173086" cy="369332"/>
-          </a:xfrm>
-          <a:prstGeom prst="rect">
-            <a:avLst/>
-          </a:prstGeom>
-          <a:noFill/>
-        </p:spPr>
-        <p:txBody>
-          <a:bodyPr wrap="square" rtlCol="0">
-            <a:spAutoFit/>
-          </a:bodyPr>
-          <a:lstStyle/>
-          <a:p>
+              <a:t>패키지와 </a:t>
+            </a:r>
+            <a:r>
+              <a:rPr lang="en-US" altLang="ko-KR" dirty="0" err="1"/>
+              <a:t>ggplot</a:t>
+            </a:r>
             <a:r>
               <a:rPr lang="ko-KR" altLang="en-US" dirty="0"/>
-              <a:t>우측이 볼록한 그래프 </a:t>
+              <a:t>을 이용해 </a:t>
+            </a:r>
+            <a:r>
+              <a:rPr lang="ko-KR" altLang="en-US" dirty="0" err="1"/>
+              <a:t>전처리</a:t>
             </a:r>
             <a:r>
               <a:rPr lang="en-US" altLang="ko-KR" dirty="0"/>
-              <a:t>-&gt; </a:t>
+              <a:t>, </a:t>
             </a:r>
             <a:r>
               <a:rPr lang="ko-KR" altLang="en-US" dirty="0"/>
-              <a:t>난이도 쉬움</a:t>
-            </a:r>
-          </a:p>
-        </p:txBody>
-      </p:sp>
-      <p:sp>
-        <p:nvSpPr>
-          <p:cNvPr id="9" name="TextBox 8">
-            <a:extLst>
-              <a:ext uri="{FF2B5EF4-FFF2-40B4-BE49-F238E27FC236}">
-                <a16:creationId xmlns:a16="http://schemas.microsoft.com/office/drawing/2014/main" id="{BA6CCE80-F996-43CB-8744-3C0DA53B1156}"/>
-              </a:ext>
-            </a:extLst>
-          </p:cNvPr>
-          <p:cNvSpPr txBox="1"/>
-          <p:nvPr/>
-        </p:nvSpPr>
-        <p:spPr>
-          <a:xfrm>
-            <a:off x="6946232" y="5204935"/>
-            <a:ext cx="4173086" cy="646331"/>
-          </a:xfrm>
-          <a:prstGeom prst="rect">
-            <a:avLst/>
-          </a:prstGeom>
-          <a:noFill/>
-        </p:spPr>
-        <p:txBody>
-          <a:bodyPr wrap="square" rtlCol="0">
-            <a:spAutoFit/>
-          </a:bodyPr>
-          <a:lstStyle/>
-          <a:p>
-            <a:r>
-              <a:rPr lang="ko-KR" altLang="en-US" dirty="0"/>
-              <a:t>좌측이 볼록한 그래프 </a:t>
-            </a:r>
-            <a:r>
-              <a:rPr lang="en-US" altLang="ko-KR" dirty="0"/>
-              <a:t>-&gt; </a:t>
-            </a:r>
-            <a:r>
-              <a:rPr lang="ko-KR" altLang="en-US" dirty="0"/>
-              <a:t>난이도 어려움</a:t>
+              <a:t>시각화 과정</a:t>
             </a:r>
           </a:p>
         </p:txBody>
@@ -5810,7 +7115,7 @@
     </p:spTree>
     <p:extLst>
       <p:ext uri="{BB962C8B-B14F-4D97-AF65-F5344CB8AC3E}">
-        <p14:creationId xmlns:p14="http://schemas.microsoft.com/office/powerpoint/2010/main" val="969780874"/>
+        <p14:creationId xmlns:p14="http://schemas.microsoft.com/office/powerpoint/2010/main" val="2946530736"/>
       </p:ext>
     </p:extLst>
   </p:cSld>
@@ -5852,7 +7157,7 @@
         <p:spPr>
           <a:xfrm>
             <a:off x="1940560" y="914400"/>
-            <a:ext cx="6888480" cy="646331"/>
+            <a:ext cx="6888480" cy="369332"/>
           </a:xfrm>
           <a:prstGeom prst="rect">
             <a:avLst/>
@@ -5867,38 +7172,159 @@
           <a:p>
             <a:r>
               <a:rPr lang="ko-KR" altLang="en-US" dirty="0"/>
-              <a:t>가설</a:t>
-            </a:r>
-            <a:r>
-              <a:rPr lang="en-US" altLang="ko-KR" dirty="0"/>
-              <a:t>2: </a:t>
-            </a:r>
-            <a:r>
-              <a:rPr lang="ko-KR" altLang="en-US" dirty="0"/>
-              <a:t>평균 정답율이 알고리즘의 난이도를 나타낼 것이다</a:t>
-            </a:r>
-            <a:r>
-              <a:rPr lang="en-US" altLang="ko-KR" dirty="0"/>
-              <a:t>.</a:t>
-            </a:r>
-          </a:p>
-          <a:p>
-            <a:r>
-              <a:rPr lang="ko-KR" altLang="en-US" dirty="0"/>
-              <a:t>평균 정답율이 높을수록 쉬운 알고리즘일 것이다</a:t>
-            </a:r>
-            <a:r>
-              <a:rPr lang="en-US" altLang="ko-KR" dirty="0"/>
-              <a:t>.</a:t>
-            </a:r>
-            <a:endParaRPr lang="ko-KR" altLang="en-US" dirty="0"/>
-          </a:p>
-        </p:txBody>
-      </p:sp>
+              <a:t>알고리즘 별 그래프</a:t>
+            </a:r>
+          </a:p>
+        </p:txBody>
+      </p:sp>
+      <p:pic>
+        <p:nvPicPr>
+          <p:cNvPr id="22" name="그림 21">
+            <a:extLst>
+              <a:ext uri="{FF2B5EF4-FFF2-40B4-BE49-F238E27FC236}">
+                <a16:creationId xmlns:a16="http://schemas.microsoft.com/office/drawing/2014/main" id="{D8E8D0AD-50FD-4EAD-A40F-F463CBA61680}"/>
+              </a:ext>
+            </a:extLst>
+          </p:cNvPr>
+          <p:cNvPicPr>
+            <a:picLocks noChangeAspect="1"/>
+          </p:cNvPicPr>
+          <p:nvPr/>
+        </p:nvPicPr>
+        <p:blipFill>
+          <a:blip r:embed="rId2">
+            <a:extLst>
+              <a:ext uri="{28A0092B-C50C-407E-A947-70E740481C1C}">
+                <a14:useLocalDpi xmlns:a14="http://schemas.microsoft.com/office/drawing/2010/main" val="0"/>
+              </a:ext>
+            </a:extLst>
+          </a:blip>
+          <a:stretch>
+            <a:fillRect/>
+          </a:stretch>
+        </p:blipFill>
+        <p:spPr>
+          <a:xfrm rot="10800000" flipH="1" flipV="1">
+            <a:off x="6312160" y="2170954"/>
+            <a:ext cx="2358577" cy="1315975"/>
+          </a:xfrm>
+          <a:prstGeom prst="rect">
+            <a:avLst/>
+          </a:prstGeom>
+        </p:spPr>
+      </p:pic>
+      <p:pic>
+        <p:nvPicPr>
+          <p:cNvPr id="30" name="그림 29">
+            <a:extLst>
+              <a:ext uri="{FF2B5EF4-FFF2-40B4-BE49-F238E27FC236}">
+                <a16:creationId xmlns:a16="http://schemas.microsoft.com/office/drawing/2014/main" id="{72CCF24A-7894-437B-8E52-83506EA572DF}"/>
+              </a:ext>
+            </a:extLst>
+          </p:cNvPr>
+          <p:cNvPicPr>
+            <a:picLocks noChangeAspect="1"/>
+          </p:cNvPicPr>
+          <p:nvPr/>
+        </p:nvPicPr>
+        <p:blipFill>
+          <a:blip r:embed="rId3">
+            <a:extLst>
+              <a:ext uri="{28A0092B-C50C-407E-A947-70E740481C1C}">
+                <a14:useLocalDpi xmlns:a14="http://schemas.microsoft.com/office/drawing/2010/main" val="0"/>
+              </a:ext>
+            </a:extLst>
+          </a:blip>
+          <a:stretch>
+            <a:fillRect/>
+          </a:stretch>
+        </p:blipFill>
+        <p:spPr>
+          <a:xfrm rot="10800000" flipH="1" flipV="1">
+            <a:off x="8562197" y="2166922"/>
+            <a:ext cx="2358577" cy="1315975"/>
+          </a:xfrm>
+          <a:prstGeom prst="rect">
+            <a:avLst/>
+          </a:prstGeom>
+        </p:spPr>
+      </p:pic>
+      <p:pic>
+        <p:nvPicPr>
+          <p:cNvPr id="54" name="그림 53">
+            <a:extLst>
+              <a:ext uri="{FF2B5EF4-FFF2-40B4-BE49-F238E27FC236}">
+                <a16:creationId xmlns:a16="http://schemas.microsoft.com/office/drawing/2014/main" id="{E5A4A48B-3521-4FFA-AEFD-67D2C53CE451}"/>
+              </a:ext>
+            </a:extLst>
+          </p:cNvPr>
+          <p:cNvPicPr>
+            <a:picLocks noChangeAspect="1"/>
+          </p:cNvPicPr>
+          <p:nvPr/>
+        </p:nvPicPr>
+        <p:blipFill>
+          <a:blip r:embed="rId4">
+            <a:extLst>
+              <a:ext uri="{28A0092B-C50C-407E-A947-70E740481C1C}">
+                <a14:useLocalDpi xmlns:a14="http://schemas.microsoft.com/office/drawing/2010/main" val="0"/>
+              </a:ext>
+            </a:extLst>
+          </a:blip>
+          <a:stretch>
+            <a:fillRect/>
+          </a:stretch>
+        </p:blipFill>
+        <p:spPr>
+          <a:xfrm rot="10800000" flipH="1" flipV="1">
+            <a:off x="8596208" y="3429000"/>
+            <a:ext cx="2358577" cy="1315975"/>
+          </a:xfrm>
+          <a:prstGeom prst="rect">
+            <a:avLst/>
+          </a:prstGeom>
+        </p:spPr>
+      </p:pic>
+      <p:pic>
+        <p:nvPicPr>
+          <p:cNvPr id="58" name="그림 57">
+            <a:extLst>
+              <a:ext uri="{FF2B5EF4-FFF2-40B4-BE49-F238E27FC236}">
+                <a16:creationId xmlns:a16="http://schemas.microsoft.com/office/drawing/2014/main" id="{14B38EF1-3F0E-4CCA-93B8-F2A33A012284}"/>
+              </a:ext>
+            </a:extLst>
+          </p:cNvPr>
+          <p:cNvPicPr>
+            <a:picLocks noChangeAspect="1"/>
+          </p:cNvPicPr>
+          <p:nvPr/>
+        </p:nvPicPr>
+        <p:blipFill>
+          <a:blip r:embed="rId5">
+            <a:extLst>
+              <a:ext uri="{28A0092B-C50C-407E-A947-70E740481C1C}">
+                <a14:useLocalDpi xmlns:a14="http://schemas.microsoft.com/office/drawing/2010/main" val="0"/>
+              </a:ext>
+            </a:extLst>
+          </a:blip>
+          <a:stretch>
+            <a:fillRect/>
+          </a:stretch>
+        </p:blipFill>
+        <p:spPr>
+          <a:xfrm rot="10800000" flipH="1" flipV="1">
+            <a:off x="6312160" y="3429000"/>
+            <a:ext cx="2358577" cy="1315975"/>
+          </a:xfrm>
+          <a:prstGeom prst="rect">
+            <a:avLst/>
+          </a:prstGeom>
+        </p:spPr>
+      </p:pic>
     </p:spTree>
     <p:extLst>
       <p:ext uri="{BB962C8B-B14F-4D97-AF65-F5344CB8AC3E}">
-        <p14:creationId xmlns:p14="http://schemas.microsoft.com/office/powerpoint/2010/main" val="3901317519"/>
+        <p14:creationId xmlns:p14="http://schemas.microsoft.com/office/powerpoint/2010/main" val="2215500991"/>
       </p:ext>
     </p:extLst>
   </p:cSld>

</xml_diff>